<commit_message>
Präsentation fertiggestellt und Dokumentation aktualisiert.
</commit_message>
<xml_diff>
--- a/doc/sharely Präsentation.pptx
+++ b/doc/sharely Präsentation.pptx
@@ -4,18 +4,22 @@
   <p:sldMasterIdLst>
     <p:sldMasterId id="2147483840" r:id="rId1"/>
   </p:sldMasterIdLst>
+  <p:notesMasterIdLst>
+    <p:notesMasterId r:id="rId14"/>
+  </p:notesMasterIdLst>
   <p:sldIdLst>
     <p:sldId id="256" r:id="rId2"/>
     <p:sldId id="257" r:id="rId3"/>
     <p:sldId id="258" r:id="rId4"/>
-    <p:sldId id="263" r:id="rId5"/>
-    <p:sldId id="262" r:id="rId6"/>
+    <p:sldId id="265" r:id="rId5"/>
+    <p:sldId id="263" r:id="rId6"/>
     <p:sldId id="267" r:id="rId7"/>
-    <p:sldId id="268" r:id="rId8"/>
-    <p:sldId id="269" r:id="rId9"/>
-    <p:sldId id="264" r:id="rId10"/>
-    <p:sldId id="265" r:id="rId11"/>
-    <p:sldId id="266" r:id="rId12"/>
+    <p:sldId id="270" r:id="rId8"/>
+    <p:sldId id="262" r:id="rId9"/>
+    <p:sldId id="268" r:id="rId10"/>
+    <p:sldId id="272" r:id="rId11"/>
+    <p:sldId id="264" r:id="rId12"/>
+    <p:sldId id="273" r:id="rId13"/>
   </p:sldIdLst>
   <p:sldSz cx="9144000" cy="6858000" type="screen4x3"/>
   <p:notesSz cx="6858000" cy="9144000"/>
@@ -114,7 +118,452 @@
       </a:defRPr>
     </a:lvl9pPr>
   </p:defaultTextStyle>
+  <p:extLst>
+    <p:ext uri="{EFAFB233-063F-42B5-8137-9DF3F51BA10A}">
+      <p15:sldGuideLst xmlns:p15="http://schemas.microsoft.com/office/powerpoint/2012/main" xmlns="">
+        <p15:guide id="1" orient="horz" pos="2160">
+          <p15:clr>
+            <a:srgbClr val="A4A3A4"/>
+          </p15:clr>
+        </p15:guide>
+        <p15:guide id="2" pos="2880">
+          <p15:clr>
+            <a:srgbClr val="A4A3A4"/>
+          </p15:clr>
+        </p15:guide>
+      </p15:sldGuideLst>
+    </p:ext>
+  </p:extLst>
 </p:presentation>
+</file>
+
+<file path=ppt/notesMasters/notesMaster1.xml><?xml version="1.0" encoding="utf-8"?>
+<p:notesMaster xmlns:a="http://schemas.openxmlformats.org/drawingml/2006/main" xmlns:r="http://schemas.openxmlformats.org/officeDocument/2006/relationships" xmlns:p="http://schemas.openxmlformats.org/presentationml/2006/main">
+  <p:cSld>
+    <p:bg>
+      <p:bgRef idx="1001">
+        <a:schemeClr val="bg1"/>
+      </p:bgRef>
+    </p:bg>
+    <p:spTree>
+      <p:nvGrpSpPr>
+        <p:cNvPr id="1" name=""/>
+        <p:cNvGrpSpPr/>
+        <p:nvPr/>
+      </p:nvGrpSpPr>
+      <p:grpSpPr>
+        <a:xfrm>
+          <a:off x="0" y="0"/>
+          <a:ext cx="0" cy="0"/>
+          <a:chOff x="0" y="0"/>
+          <a:chExt cx="0" cy="0"/>
+        </a:xfrm>
+      </p:grpSpPr>
+      <p:sp>
+        <p:nvSpPr>
+          <p:cNvPr id="2" name="Kopfzeilenplatzhalter 1"/>
+          <p:cNvSpPr>
+            <a:spLocks noGrp="1"/>
+          </p:cNvSpPr>
+          <p:nvPr>
+            <p:ph type="hdr" sz="quarter"/>
+          </p:nvPr>
+        </p:nvSpPr>
+        <p:spPr>
+          <a:xfrm>
+            <a:off x="0" y="0"/>
+            <a:ext cx="2971800" cy="457200"/>
+          </a:xfrm>
+          <a:prstGeom prst="rect">
+            <a:avLst/>
+          </a:prstGeom>
+        </p:spPr>
+        <p:txBody>
+          <a:bodyPr vert="horz" lIns="91440" tIns="45720" rIns="91440" bIns="45720" rtlCol="0"/>
+          <a:lstStyle>
+            <a:lvl1pPr algn="l">
+              <a:defRPr sz="1200"/>
+            </a:lvl1pPr>
+          </a:lstStyle>
+          <a:p>
+            <a:endParaRPr lang="en-GB"/>
+          </a:p>
+        </p:txBody>
+      </p:sp>
+      <p:sp>
+        <p:nvSpPr>
+          <p:cNvPr id="3" name="Datumsplatzhalter 2"/>
+          <p:cNvSpPr>
+            <a:spLocks noGrp="1"/>
+          </p:cNvSpPr>
+          <p:nvPr>
+            <p:ph type="dt" idx="1"/>
+          </p:nvPr>
+        </p:nvSpPr>
+        <p:spPr>
+          <a:xfrm>
+            <a:off x="3884613" y="0"/>
+            <a:ext cx="2971800" cy="457200"/>
+          </a:xfrm>
+          <a:prstGeom prst="rect">
+            <a:avLst/>
+          </a:prstGeom>
+        </p:spPr>
+        <p:txBody>
+          <a:bodyPr vert="horz" lIns="91440" tIns="45720" rIns="91440" bIns="45720" rtlCol="0"/>
+          <a:lstStyle>
+            <a:lvl1pPr algn="r">
+              <a:defRPr sz="1200"/>
+            </a:lvl1pPr>
+          </a:lstStyle>
+          <a:p>
+            <a:fld id="{2E84821E-4335-4310-BD9B-3008C09A3F57}" type="datetimeFigureOut">
+              <a:rPr lang="en-GB" smtClean="0"/>
+              <a:t>15/01/2015</a:t>
+            </a:fld>
+            <a:endParaRPr lang="en-GB"/>
+          </a:p>
+        </p:txBody>
+      </p:sp>
+      <p:sp>
+        <p:nvSpPr>
+          <p:cNvPr id="4" name="Folienbildplatzhalter 3"/>
+          <p:cNvSpPr>
+            <a:spLocks noGrp="1" noRot="1" noChangeAspect="1"/>
+          </p:cNvSpPr>
+          <p:nvPr>
+            <p:ph type="sldImg" idx="2"/>
+          </p:nvPr>
+        </p:nvSpPr>
+        <p:spPr>
+          <a:xfrm>
+            <a:off x="1143000" y="685800"/>
+            <a:ext cx="4572000" cy="3429000"/>
+          </a:xfrm>
+          <a:prstGeom prst="rect">
+            <a:avLst/>
+          </a:prstGeom>
+          <a:noFill/>
+          <a:ln w="12700">
+            <a:solidFill>
+              <a:prstClr val="black"/>
+            </a:solidFill>
+          </a:ln>
+        </p:spPr>
+        <p:txBody>
+          <a:bodyPr vert="horz" lIns="91440" tIns="45720" rIns="91440" bIns="45720" rtlCol="0" anchor="ctr"/>
+          <a:lstStyle/>
+          <a:p>
+            <a:endParaRPr lang="en-GB"/>
+          </a:p>
+        </p:txBody>
+      </p:sp>
+      <p:sp>
+        <p:nvSpPr>
+          <p:cNvPr id="5" name="Notizenplatzhalter 4"/>
+          <p:cNvSpPr>
+            <a:spLocks noGrp="1"/>
+          </p:cNvSpPr>
+          <p:nvPr>
+            <p:ph type="body" sz="quarter" idx="3"/>
+          </p:nvPr>
+        </p:nvSpPr>
+        <p:spPr>
+          <a:xfrm>
+            <a:off x="685800" y="4343400"/>
+            <a:ext cx="5486400" cy="4114800"/>
+          </a:xfrm>
+          <a:prstGeom prst="rect">
+            <a:avLst/>
+          </a:prstGeom>
+        </p:spPr>
+        <p:txBody>
+          <a:bodyPr vert="horz" lIns="91440" tIns="45720" rIns="91440" bIns="45720" rtlCol="0">
+            <a:normAutofit/>
+          </a:bodyPr>
+          <a:lstStyle/>
+          <a:p>
+            <a:pPr lvl="0"/>
+            <a:r>
+              <a:rPr lang="de-DE" smtClean="0"/>
+              <a:t>Textmasterformate durch Klicken bearbeiten</a:t>
+            </a:r>
+          </a:p>
+          <a:p>
+            <a:pPr lvl="1"/>
+            <a:r>
+              <a:rPr lang="de-DE" smtClean="0"/>
+              <a:t>Zweite Ebene</a:t>
+            </a:r>
+          </a:p>
+          <a:p>
+            <a:pPr lvl="2"/>
+            <a:r>
+              <a:rPr lang="de-DE" smtClean="0"/>
+              <a:t>Dritte Ebene</a:t>
+            </a:r>
+          </a:p>
+          <a:p>
+            <a:pPr lvl="3"/>
+            <a:r>
+              <a:rPr lang="de-DE" smtClean="0"/>
+              <a:t>Vierte Ebene</a:t>
+            </a:r>
+          </a:p>
+          <a:p>
+            <a:pPr lvl="4"/>
+            <a:r>
+              <a:rPr lang="de-DE" smtClean="0"/>
+              <a:t>Fünfte Ebene</a:t>
+            </a:r>
+            <a:endParaRPr lang="en-GB"/>
+          </a:p>
+        </p:txBody>
+      </p:sp>
+      <p:sp>
+        <p:nvSpPr>
+          <p:cNvPr id="6" name="Fußzeilenplatzhalter 5"/>
+          <p:cNvSpPr>
+            <a:spLocks noGrp="1"/>
+          </p:cNvSpPr>
+          <p:nvPr>
+            <p:ph type="ftr" sz="quarter" idx="4"/>
+          </p:nvPr>
+        </p:nvSpPr>
+        <p:spPr>
+          <a:xfrm>
+            <a:off x="0" y="8685213"/>
+            <a:ext cx="2971800" cy="457200"/>
+          </a:xfrm>
+          <a:prstGeom prst="rect">
+            <a:avLst/>
+          </a:prstGeom>
+        </p:spPr>
+        <p:txBody>
+          <a:bodyPr vert="horz" lIns="91440" tIns="45720" rIns="91440" bIns="45720" rtlCol="0" anchor="b"/>
+          <a:lstStyle>
+            <a:lvl1pPr algn="l">
+              <a:defRPr sz="1200"/>
+            </a:lvl1pPr>
+          </a:lstStyle>
+          <a:p>
+            <a:endParaRPr lang="en-GB"/>
+          </a:p>
+        </p:txBody>
+      </p:sp>
+      <p:sp>
+        <p:nvSpPr>
+          <p:cNvPr id="7" name="Foliennummernplatzhalter 6"/>
+          <p:cNvSpPr>
+            <a:spLocks noGrp="1"/>
+          </p:cNvSpPr>
+          <p:nvPr>
+            <p:ph type="sldNum" sz="quarter" idx="5"/>
+          </p:nvPr>
+        </p:nvSpPr>
+        <p:spPr>
+          <a:xfrm>
+            <a:off x="3884613" y="8685213"/>
+            <a:ext cx="2971800" cy="457200"/>
+          </a:xfrm>
+          <a:prstGeom prst="rect">
+            <a:avLst/>
+          </a:prstGeom>
+        </p:spPr>
+        <p:txBody>
+          <a:bodyPr vert="horz" lIns="91440" tIns="45720" rIns="91440" bIns="45720" rtlCol="0" anchor="b"/>
+          <a:lstStyle>
+            <a:lvl1pPr algn="r">
+              <a:defRPr sz="1200"/>
+            </a:lvl1pPr>
+          </a:lstStyle>
+          <a:p>
+            <a:fld id="{14A9E72B-2877-4B29-A63D-33C1953C9EEE}" type="slidenum">
+              <a:rPr lang="en-GB" smtClean="0"/>
+              <a:t>‹Nr.›</a:t>
+            </a:fld>
+            <a:endParaRPr lang="en-GB"/>
+          </a:p>
+        </p:txBody>
+      </p:sp>
+    </p:spTree>
+  </p:cSld>
+  <p:clrMap bg1="lt1" tx1="dk1" bg2="lt2" tx2="dk2" accent1="accent1" accent2="accent2" accent3="accent3" accent4="accent4" accent5="accent5" accent6="accent6" hlink="hlink" folHlink="folHlink"/>
+  <p:notesStyle>
+    <a:lvl1pPr marL="0" algn="l" defTabSz="914400" rtl="0" eaLnBrk="1" latinLnBrk="0" hangingPunct="1">
+      <a:defRPr sz="1200" kern="1200">
+        <a:solidFill>
+          <a:schemeClr val="tx1"/>
+        </a:solidFill>
+        <a:latin typeface="+mn-lt"/>
+        <a:ea typeface="+mn-ea"/>
+        <a:cs typeface="+mn-cs"/>
+      </a:defRPr>
+    </a:lvl1pPr>
+    <a:lvl2pPr marL="457200" algn="l" defTabSz="914400" rtl="0" eaLnBrk="1" latinLnBrk="0" hangingPunct="1">
+      <a:defRPr sz="1200" kern="1200">
+        <a:solidFill>
+          <a:schemeClr val="tx1"/>
+        </a:solidFill>
+        <a:latin typeface="+mn-lt"/>
+        <a:ea typeface="+mn-ea"/>
+        <a:cs typeface="+mn-cs"/>
+      </a:defRPr>
+    </a:lvl2pPr>
+    <a:lvl3pPr marL="914400" algn="l" defTabSz="914400" rtl="0" eaLnBrk="1" latinLnBrk="0" hangingPunct="1">
+      <a:defRPr sz="1200" kern="1200">
+        <a:solidFill>
+          <a:schemeClr val="tx1"/>
+        </a:solidFill>
+        <a:latin typeface="+mn-lt"/>
+        <a:ea typeface="+mn-ea"/>
+        <a:cs typeface="+mn-cs"/>
+      </a:defRPr>
+    </a:lvl3pPr>
+    <a:lvl4pPr marL="1371600" algn="l" defTabSz="914400" rtl="0" eaLnBrk="1" latinLnBrk="0" hangingPunct="1">
+      <a:defRPr sz="1200" kern="1200">
+        <a:solidFill>
+          <a:schemeClr val="tx1"/>
+        </a:solidFill>
+        <a:latin typeface="+mn-lt"/>
+        <a:ea typeface="+mn-ea"/>
+        <a:cs typeface="+mn-cs"/>
+      </a:defRPr>
+    </a:lvl4pPr>
+    <a:lvl5pPr marL="1828800" algn="l" defTabSz="914400" rtl="0" eaLnBrk="1" latinLnBrk="0" hangingPunct="1">
+      <a:defRPr sz="1200" kern="1200">
+        <a:solidFill>
+          <a:schemeClr val="tx1"/>
+        </a:solidFill>
+        <a:latin typeface="+mn-lt"/>
+        <a:ea typeface="+mn-ea"/>
+        <a:cs typeface="+mn-cs"/>
+      </a:defRPr>
+    </a:lvl5pPr>
+    <a:lvl6pPr marL="2286000" algn="l" defTabSz="914400" rtl="0" eaLnBrk="1" latinLnBrk="0" hangingPunct="1">
+      <a:defRPr sz="1200" kern="1200">
+        <a:solidFill>
+          <a:schemeClr val="tx1"/>
+        </a:solidFill>
+        <a:latin typeface="+mn-lt"/>
+        <a:ea typeface="+mn-ea"/>
+        <a:cs typeface="+mn-cs"/>
+      </a:defRPr>
+    </a:lvl6pPr>
+    <a:lvl7pPr marL="2743200" algn="l" defTabSz="914400" rtl="0" eaLnBrk="1" latinLnBrk="0" hangingPunct="1">
+      <a:defRPr sz="1200" kern="1200">
+        <a:solidFill>
+          <a:schemeClr val="tx1"/>
+        </a:solidFill>
+        <a:latin typeface="+mn-lt"/>
+        <a:ea typeface="+mn-ea"/>
+        <a:cs typeface="+mn-cs"/>
+      </a:defRPr>
+    </a:lvl7pPr>
+    <a:lvl8pPr marL="3200400" algn="l" defTabSz="914400" rtl="0" eaLnBrk="1" latinLnBrk="0" hangingPunct="1">
+      <a:defRPr sz="1200" kern="1200">
+        <a:solidFill>
+          <a:schemeClr val="tx1"/>
+        </a:solidFill>
+        <a:latin typeface="+mn-lt"/>
+        <a:ea typeface="+mn-ea"/>
+        <a:cs typeface="+mn-cs"/>
+      </a:defRPr>
+    </a:lvl8pPr>
+    <a:lvl9pPr marL="3657600" algn="l" defTabSz="914400" rtl="0" eaLnBrk="1" latinLnBrk="0" hangingPunct="1">
+      <a:defRPr sz="1200" kern="1200">
+        <a:solidFill>
+          <a:schemeClr val="tx1"/>
+        </a:solidFill>
+        <a:latin typeface="+mn-lt"/>
+        <a:ea typeface="+mn-ea"/>
+        <a:cs typeface="+mn-cs"/>
+      </a:defRPr>
+    </a:lvl9pPr>
+  </p:notesStyle>
+</p:notesMaster>
+</file>
+
+<file path=ppt/notesSlides/notesSlide1.xml><?xml version="1.0" encoding="utf-8"?>
+<p:notes xmlns:a="http://schemas.openxmlformats.org/drawingml/2006/main" xmlns:r="http://schemas.openxmlformats.org/officeDocument/2006/relationships" xmlns:p="http://schemas.openxmlformats.org/presentationml/2006/main">
+  <p:cSld>
+    <p:spTree>
+      <p:nvGrpSpPr>
+        <p:cNvPr id="1" name=""/>
+        <p:cNvGrpSpPr/>
+        <p:nvPr/>
+      </p:nvGrpSpPr>
+      <p:grpSpPr>
+        <a:xfrm>
+          <a:off x="0" y="0"/>
+          <a:ext cx="0" cy="0"/>
+          <a:chOff x="0" y="0"/>
+          <a:chExt cx="0" cy="0"/>
+        </a:xfrm>
+      </p:grpSpPr>
+      <p:sp>
+        <p:nvSpPr>
+          <p:cNvPr id="2" name="Folienbildplatzhalter 1"/>
+          <p:cNvSpPr>
+            <a:spLocks noGrp="1" noRot="1" noChangeAspect="1"/>
+          </p:cNvSpPr>
+          <p:nvPr>
+            <p:ph type="sldImg"/>
+          </p:nvPr>
+        </p:nvSpPr>
+        <p:spPr/>
+      </p:sp>
+      <p:sp>
+        <p:nvSpPr>
+          <p:cNvPr id="3" name="Notizenplatzhalter 2"/>
+          <p:cNvSpPr>
+            <a:spLocks noGrp="1"/>
+          </p:cNvSpPr>
+          <p:nvPr>
+            <p:ph type="body" idx="1"/>
+          </p:nvPr>
+        </p:nvSpPr>
+        <p:spPr/>
+        <p:txBody>
+          <a:bodyPr>
+            <a:normAutofit/>
+          </a:bodyPr>
+          <a:lstStyle/>
+          <a:p>
+            <a:endParaRPr lang="en-GB" dirty="0"/>
+          </a:p>
+        </p:txBody>
+      </p:sp>
+      <p:sp>
+        <p:nvSpPr>
+          <p:cNvPr id="4" name="Foliennummernplatzhalter 3"/>
+          <p:cNvSpPr>
+            <a:spLocks noGrp="1"/>
+          </p:cNvSpPr>
+          <p:nvPr>
+            <p:ph type="sldNum" sz="quarter" idx="10"/>
+          </p:nvPr>
+        </p:nvSpPr>
+        <p:spPr/>
+        <p:txBody>
+          <a:bodyPr/>
+          <a:lstStyle/>
+          <a:p>
+            <a:fld id="{871B789F-5E61-4407-9474-041443D0862F}" type="slidenum">
+              <a:rPr lang="en-GB" smtClean="0"/>
+              <a:pPr/>
+              <a:t>12</a:t>
+            </a:fld>
+            <a:endParaRPr lang="en-GB"/>
+          </a:p>
+        </p:txBody>
+      </p:sp>
+    </p:spTree>
+  </p:cSld>
+  <p:clrMapOvr>
+    <a:masterClrMapping/>
+  </p:clrMapOvr>
+</p:notes>
 </file>
 
 <file path=ppt/slideLayouts/slideLayout1.xml><?xml version="1.0" encoding="utf-8"?>
@@ -743,7 +1192,7 @@
             <a:fld id="{9711488B-E01B-4F58-B43C-C2F9108E46DD}" type="datetimeFigureOut">
               <a:rPr lang="en-GB" smtClean="0"/>
               <a:pPr/>
-              <a:t>09/01/2015</a:t>
+              <a:t>15/01/2015</a:t>
             </a:fld>
             <a:endParaRPr lang="en-GB"/>
           </a:p>
@@ -941,7 +1390,7 @@
             <a:fld id="{9711488B-E01B-4F58-B43C-C2F9108E46DD}" type="datetimeFigureOut">
               <a:rPr lang="en-GB" smtClean="0"/>
               <a:pPr/>
-              <a:t>09/01/2015</a:t>
+              <a:t>15/01/2015</a:t>
             </a:fld>
             <a:endParaRPr lang="en-GB"/>
           </a:p>
@@ -1128,7 +1577,7 @@
             <a:fld id="{9711488B-E01B-4F58-B43C-C2F9108E46DD}" type="datetimeFigureOut">
               <a:rPr lang="en-GB" smtClean="0"/>
               <a:pPr/>
-              <a:t>09/01/2015</a:t>
+              <a:t>15/01/2015</a:t>
             </a:fld>
             <a:endParaRPr lang="en-GB"/>
           </a:p>
@@ -1280,7 +1729,7 @@
             <a:fld id="{9711488B-E01B-4F58-B43C-C2F9108E46DD}" type="datetimeFigureOut">
               <a:rPr lang="en-GB" smtClean="0"/>
               <a:pPr/>
-              <a:t>09/01/2015</a:t>
+              <a:t>15/01/2015</a:t>
             </a:fld>
             <a:endParaRPr lang="en-GB"/>
           </a:p>
@@ -1537,7 +1986,7 @@
             <a:fld id="{9711488B-E01B-4F58-B43C-C2F9108E46DD}" type="datetimeFigureOut">
               <a:rPr lang="en-GB" smtClean="0"/>
               <a:pPr/>
-              <a:t>09/01/2015</a:t>
+              <a:t>15/01/2015</a:t>
             </a:fld>
             <a:endParaRPr lang="en-GB"/>
           </a:p>
@@ -1948,7 +2397,7 @@
             <a:fld id="{9711488B-E01B-4F58-B43C-C2F9108E46DD}" type="datetimeFigureOut">
               <a:rPr lang="en-GB" smtClean="0"/>
               <a:pPr/>
-              <a:t>09/01/2015</a:t>
+              <a:t>15/01/2015</a:t>
             </a:fld>
             <a:endParaRPr lang="en-GB"/>
           </a:p>
@@ -2396,7 +2845,7 @@
             <a:fld id="{9711488B-E01B-4F58-B43C-C2F9108E46DD}" type="datetimeFigureOut">
               <a:rPr lang="en-GB" smtClean="0"/>
               <a:pPr/>
-              <a:t>09/01/2015</a:t>
+              <a:t>15/01/2015</a:t>
             </a:fld>
             <a:endParaRPr lang="en-GB"/>
           </a:p>
@@ -2499,7 +2948,7 @@
             <a:fld id="{9711488B-E01B-4F58-B43C-C2F9108E46DD}" type="datetimeFigureOut">
               <a:rPr lang="en-GB" smtClean="0"/>
               <a:pPr/>
-              <a:t>09/01/2015</a:t>
+              <a:t>15/01/2015</a:t>
             </a:fld>
             <a:endParaRPr lang="en-GB"/>
           </a:p>
@@ -2622,7 +3071,7 @@
             <a:fld id="{9711488B-E01B-4F58-B43C-C2F9108E46DD}" type="datetimeFigureOut">
               <a:rPr lang="en-GB" smtClean="0"/>
               <a:pPr/>
-              <a:t>09/01/2015</a:t>
+              <a:t>15/01/2015</a:t>
             </a:fld>
             <a:endParaRPr lang="en-GB"/>
           </a:p>
@@ -2898,7 +3347,7 @@
             <a:fld id="{9711488B-E01B-4F58-B43C-C2F9108E46DD}" type="datetimeFigureOut">
               <a:rPr lang="en-GB" smtClean="0"/>
               <a:pPr/>
-              <a:t>09/01/2015</a:t>
+              <a:t>15/01/2015</a:t>
             </a:fld>
             <a:endParaRPr lang="en-GB"/>
           </a:p>
@@ -3105,7 +3554,7 @@
             <a:fld id="{9711488B-E01B-4F58-B43C-C2F9108E46DD}" type="datetimeFigureOut">
               <a:rPr lang="en-GB" smtClean="0"/>
               <a:pPr/>
-              <a:t>09/01/2015</a:t>
+              <a:t>15/01/2015</a:t>
             </a:fld>
             <a:endParaRPr lang="en-GB"/>
           </a:p>
@@ -4216,7 +4665,7 @@
             <a:fld id="{9711488B-E01B-4F58-B43C-C2F9108E46DD}" type="datetimeFigureOut">
               <a:rPr lang="en-GB" smtClean="0"/>
               <a:pPr/>
-              <a:t>09/01/2015</a:t>
+              <a:t>15/01/2015</a:t>
             </a:fld>
             <a:endParaRPr lang="en-GB"/>
           </a:p>
@@ -4735,6 +5184,646 @@
           <a:lstStyle/>
           <a:p>
             <a:r>
+              <a:rPr lang="en-GB" dirty="0" smtClean="0"/>
+              <a:t>Navigation </a:t>
+            </a:r>
+            <a:r>
+              <a:rPr lang="en-GB" dirty="0" err="1" smtClean="0"/>
+              <a:t>anhand</a:t>
+            </a:r>
+            <a:r>
+              <a:rPr lang="en-GB" dirty="0"/>
+              <a:t> </a:t>
+            </a:r>
+            <a:r>
+              <a:rPr lang="en-GB" dirty="0" err="1" smtClean="0"/>
+              <a:t>der</a:t>
+            </a:r>
+            <a:r>
+              <a:rPr lang="en-GB" dirty="0" smtClean="0"/>
+              <a:t> </a:t>
+            </a:r>
+            <a:r>
+              <a:rPr lang="en-GB" dirty="0" err="1" smtClean="0"/>
+              <a:t>Suchresultate</a:t>
+            </a:r>
+            <a:r>
+              <a:rPr lang="en-GB" dirty="0" smtClean="0"/>
+              <a:t> </a:t>
+            </a:r>
+            <a:r>
+              <a:rPr lang="en-GB" dirty="0" err="1" smtClean="0"/>
+              <a:t>aufbereiten</a:t>
+            </a:r>
+            <a:endParaRPr lang="en-GB" dirty="0" smtClean="0"/>
+          </a:p>
+          <a:p>
+            <a:r>
+              <a:rPr lang="en-GB" dirty="0" smtClean="0"/>
+              <a:t>URL-</a:t>
+            </a:r>
+            <a:r>
+              <a:rPr lang="en-GB" dirty="0" err="1" smtClean="0"/>
+              <a:t>Aufbereitung</a:t>
+            </a:r>
+            <a:endParaRPr lang="en-GB" dirty="0" smtClean="0"/>
+          </a:p>
+          <a:p>
+            <a:r>
+              <a:rPr lang="en-GB" dirty="0" err="1" smtClean="0"/>
+              <a:t>Verschiedene</a:t>
+            </a:r>
+            <a:r>
+              <a:rPr lang="en-GB" dirty="0" smtClean="0"/>
+              <a:t> </a:t>
+            </a:r>
+            <a:r>
+              <a:rPr lang="en-GB" dirty="0" err="1" smtClean="0"/>
+              <a:t>Suchoptionen</a:t>
+            </a:r>
+            <a:endParaRPr lang="en-GB" dirty="0" smtClean="0"/>
+          </a:p>
+          <a:p>
+            <a:r>
+              <a:rPr lang="en-GB" dirty="0" err="1" smtClean="0"/>
+              <a:t>Umkreissuche</a:t>
+            </a:r>
+            <a:endParaRPr lang="en-GB" dirty="0"/>
+          </a:p>
+        </p:txBody>
+      </p:sp>
+      <p:sp>
+        <p:nvSpPr>
+          <p:cNvPr id="3" name="Titel 2"/>
+          <p:cNvSpPr>
+            <a:spLocks noGrp="1"/>
+          </p:cNvSpPr>
+          <p:nvPr>
+            <p:ph type="title"/>
+          </p:nvPr>
+        </p:nvSpPr>
+        <p:spPr/>
+        <p:txBody>
+          <a:bodyPr>
+            <a:normAutofit/>
+          </a:bodyPr>
+          <a:lstStyle/>
+          <a:p>
+            <a:r>
+              <a:rPr lang="de-CH" dirty="0" smtClean="0"/>
+              <a:t>Dynamische Navigation</a:t>
+            </a:r>
+            <a:endParaRPr lang="en-GB" dirty="0"/>
+          </a:p>
+        </p:txBody>
+      </p:sp>
+    </p:spTree>
+    <p:extLst>
+      <p:ext uri="{BB962C8B-B14F-4D97-AF65-F5344CB8AC3E}">
+        <p14:creationId xmlns:p14="http://schemas.microsoft.com/office/powerpoint/2010/main" xmlns="" val="3378392991"/>
+      </p:ext>
+    </p:extLst>
+  </p:cSld>
+  <p:clrMapOvr>
+    <a:masterClrMapping/>
+  </p:clrMapOvr>
+  <p:timing>
+    <p:tnLst>
+      <p:par>
+        <p:cTn id="1" dur="indefinite" restart="never" nodeType="tmRoot"/>
+      </p:par>
+    </p:tnLst>
+  </p:timing>
+</p:sld>
+</file>
+
+<file path=ppt/slides/slide11.xml><?xml version="1.0" encoding="utf-8"?>
+<p:sld xmlns:a="http://schemas.openxmlformats.org/drawingml/2006/main" xmlns:r="http://schemas.openxmlformats.org/officeDocument/2006/relationships" xmlns:p="http://schemas.openxmlformats.org/presentationml/2006/main">
+  <p:cSld>
+    <p:spTree>
+      <p:nvGrpSpPr>
+        <p:cNvPr id="1" name=""/>
+        <p:cNvGrpSpPr/>
+        <p:nvPr/>
+      </p:nvGrpSpPr>
+      <p:grpSpPr>
+        <a:xfrm>
+          <a:off x="0" y="0"/>
+          <a:ext cx="0" cy="0"/>
+          <a:chOff x="0" y="0"/>
+          <a:chExt cx="0" cy="0"/>
+        </a:xfrm>
+      </p:grpSpPr>
+      <p:sp>
+        <p:nvSpPr>
+          <p:cNvPr id="2" name="Inhaltsplatzhalter 1"/>
+          <p:cNvSpPr>
+            <a:spLocks noGrp="1"/>
+          </p:cNvSpPr>
+          <p:nvPr>
+            <p:ph idx="1"/>
+          </p:nvPr>
+        </p:nvSpPr>
+        <p:spPr/>
+        <p:txBody>
+          <a:bodyPr/>
+          <a:lstStyle/>
+          <a:p>
+            <a:r>
+              <a:rPr lang="de-CH" dirty="0" smtClean="0"/>
+              <a:t>Demo der Features</a:t>
+            </a:r>
+            <a:endParaRPr lang="de-CH" dirty="0" smtClean="0"/>
+          </a:p>
+          <a:p>
+            <a:pPr lvl="1"/>
+            <a:r>
+              <a:rPr lang="de-CH" dirty="0" smtClean="0"/>
+              <a:t>Registrierung</a:t>
+            </a:r>
+          </a:p>
+          <a:p>
+            <a:pPr lvl="1"/>
+            <a:r>
+              <a:rPr lang="de-CH" dirty="0" smtClean="0"/>
+              <a:t>Produkt-Upload</a:t>
+            </a:r>
+          </a:p>
+          <a:p>
+            <a:pPr lvl="1"/>
+            <a:r>
+              <a:rPr lang="de-CH" dirty="0" smtClean="0"/>
+              <a:t>Umkreissuche</a:t>
+            </a:r>
+            <a:endParaRPr lang="en-GB" dirty="0" smtClean="0"/>
+          </a:p>
+          <a:p>
+            <a:pPr lvl="1"/>
+            <a:r>
+              <a:rPr lang="de-CH" dirty="0" smtClean="0"/>
+              <a:t>Tausch</a:t>
+            </a:r>
+          </a:p>
+          <a:p>
+            <a:pPr lvl="1"/>
+            <a:r>
+              <a:rPr lang="de-CH" dirty="0" smtClean="0"/>
+              <a:t>Bewertung</a:t>
+            </a:r>
+          </a:p>
+        </p:txBody>
+      </p:sp>
+      <p:sp>
+        <p:nvSpPr>
+          <p:cNvPr id="3" name="Titel 2"/>
+          <p:cNvSpPr>
+            <a:spLocks noGrp="1"/>
+          </p:cNvSpPr>
+          <p:nvPr>
+            <p:ph type="title"/>
+          </p:nvPr>
+        </p:nvSpPr>
+        <p:spPr/>
+        <p:txBody>
+          <a:bodyPr/>
+          <a:lstStyle/>
+          <a:p>
+            <a:r>
+              <a:rPr lang="de-CH" dirty="0" smtClean="0"/>
+              <a:t>Demo</a:t>
+            </a:r>
+            <a:endParaRPr lang="en-GB" dirty="0"/>
+          </a:p>
+        </p:txBody>
+      </p:sp>
+    </p:spTree>
+  </p:cSld>
+  <p:clrMapOvr>
+    <a:masterClrMapping/>
+  </p:clrMapOvr>
+</p:sld>
+</file>
+
+<file path=ppt/slides/slide12.xml><?xml version="1.0" encoding="utf-8"?>
+<p:sld xmlns:a="http://schemas.openxmlformats.org/drawingml/2006/main" xmlns:r="http://schemas.openxmlformats.org/officeDocument/2006/relationships" xmlns:p="http://schemas.openxmlformats.org/presentationml/2006/main">
+  <p:cSld>
+    <p:spTree>
+      <p:nvGrpSpPr>
+        <p:cNvPr id="1" name=""/>
+        <p:cNvGrpSpPr/>
+        <p:nvPr/>
+      </p:nvGrpSpPr>
+      <p:grpSpPr>
+        <a:xfrm>
+          <a:off x="0" y="0"/>
+          <a:ext cx="0" cy="0"/>
+          <a:chOff x="0" y="0"/>
+          <a:chExt cx="0" cy="0"/>
+        </a:xfrm>
+      </p:grpSpPr>
+      <p:sp>
+        <p:nvSpPr>
+          <p:cNvPr id="2" name="Inhaltsplatzhalter 1"/>
+          <p:cNvSpPr>
+            <a:spLocks noGrp="1"/>
+          </p:cNvSpPr>
+          <p:nvPr>
+            <p:ph idx="1"/>
+          </p:nvPr>
+        </p:nvSpPr>
+        <p:spPr/>
+        <p:txBody>
+          <a:bodyPr/>
+          <a:lstStyle/>
+          <a:p>
+            <a:pPr>
+              <a:buNone/>
+            </a:pPr>
+            <a:endParaRPr lang="de-CH" dirty="0" smtClean="0"/>
+          </a:p>
+          <a:p>
+            <a:pPr algn="ctr">
+              <a:buNone/>
+            </a:pPr>
+            <a:r>
+              <a:rPr lang="de-CH" sz="23900" dirty="0" smtClean="0">
+                <a:ln w="18415" cmpd="sng">
+                  <a:solidFill>
+                    <a:srgbClr val="FFFFFF"/>
+                  </a:solidFill>
+                  <a:prstDash val="solid"/>
+                </a:ln>
+                <a:solidFill>
+                  <a:srgbClr val="FFFFFF"/>
+                </a:solidFill>
+                <a:effectLst>
+                  <a:outerShdw blurRad="63500" dir="3600000" algn="tl" rotWithShape="0">
+                    <a:srgbClr val="000000">
+                      <a:alpha val="70000"/>
+                    </a:srgbClr>
+                  </a:outerShdw>
+                </a:effectLst>
+              </a:rPr>
+              <a:t>?</a:t>
+            </a:r>
+            <a:endParaRPr lang="en-GB" sz="23900" dirty="0">
+              <a:ln w="18415" cmpd="sng">
+                <a:solidFill>
+                  <a:srgbClr val="FFFFFF"/>
+                </a:solidFill>
+                <a:prstDash val="solid"/>
+              </a:ln>
+              <a:solidFill>
+                <a:srgbClr val="FFFFFF"/>
+              </a:solidFill>
+              <a:effectLst>
+                <a:outerShdw blurRad="63500" dir="3600000" algn="tl" rotWithShape="0">
+                  <a:srgbClr val="000000">
+                    <a:alpha val="70000"/>
+                  </a:srgbClr>
+                </a:outerShdw>
+              </a:effectLst>
+            </a:endParaRPr>
+          </a:p>
+        </p:txBody>
+      </p:sp>
+      <p:sp>
+        <p:nvSpPr>
+          <p:cNvPr id="3" name="Titel 2"/>
+          <p:cNvSpPr>
+            <a:spLocks noGrp="1"/>
+          </p:cNvSpPr>
+          <p:nvPr>
+            <p:ph type="title"/>
+          </p:nvPr>
+        </p:nvSpPr>
+        <p:spPr/>
+        <p:txBody>
+          <a:bodyPr/>
+          <a:lstStyle/>
+          <a:p>
+            <a:r>
+              <a:rPr lang="de-CH" dirty="0" smtClean="0"/>
+              <a:t>Fragen</a:t>
+            </a:r>
+            <a:endParaRPr lang="en-GB" dirty="0"/>
+          </a:p>
+        </p:txBody>
+      </p:sp>
+    </p:spTree>
+  </p:cSld>
+  <p:clrMapOvr>
+    <a:masterClrMapping/>
+  </p:clrMapOvr>
+  <p:timing>
+    <p:tnLst>
+      <p:par>
+        <p:cTn id="1" dur="indefinite" restart="never" nodeType="tmRoot"/>
+      </p:par>
+    </p:tnLst>
+  </p:timing>
+</p:sld>
+</file>
+
+<file path=ppt/slides/slide2.xml><?xml version="1.0" encoding="utf-8"?>
+<p:sld xmlns:a="http://schemas.openxmlformats.org/drawingml/2006/main" xmlns:r="http://schemas.openxmlformats.org/officeDocument/2006/relationships" xmlns:p="http://schemas.openxmlformats.org/presentationml/2006/main">
+  <p:cSld>
+    <p:spTree>
+      <p:nvGrpSpPr>
+        <p:cNvPr id="1" name=""/>
+        <p:cNvGrpSpPr/>
+        <p:nvPr/>
+      </p:nvGrpSpPr>
+      <p:grpSpPr>
+        <a:xfrm>
+          <a:off x="0" y="0"/>
+          <a:ext cx="0" cy="0"/>
+          <a:chOff x="0" y="0"/>
+          <a:chExt cx="0" cy="0"/>
+        </a:xfrm>
+      </p:grpSpPr>
+      <p:sp>
+        <p:nvSpPr>
+          <p:cNvPr id="2" name="Inhaltsplatzhalter 1"/>
+          <p:cNvSpPr>
+            <a:spLocks noGrp="1"/>
+          </p:cNvSpPr>
+          <p:nvPr>
+            <p:ph idx="1"/>
+          </p:nvPr>
+        </p:nvSpPr>
+        <p:spPr/>
+        <p:txBody>
+          <a:bodyPr/>
+          <a:lstStyle/>
+          <a:p>
+            <a:r>
+              <a:rPr lang="de-CH" dirty="0" smtClean="0"/>
+              <a:t>Idee</a:t>
+            </a:r>
+          </a:p>
+          <a:p>
+            <a:r>
+              <a:rPr lang="de-CH" dirty="0"/>
+              <a:t>Zusammenarbeit</a:t>
+            </a:r>
+          </a:p>
+          <a:p>
+            <a:r>
+              <a:rPr lang="de-CH" dirty="0" smtClean="0"/>
+              <a:t>Technologien</a:t>
+            </a:r>
+            <a:endParaRPr lang="de-CH" dirty="0" smtClean="0"/>
+          </a:p>
+          <a:p>
+            <a:r>
+              <a:rPr lang="de-CH" dirty="0" smtClean="0"/>
+              <a:t>Key Elements</a:t>
+            </a:r>
+          </a:p>
+          <a:p>
+            <a:pPr lvl="1"/>
+            <a:r>
+              <a:rPr lang="de-CH" dirty="0" smtClean="0"/>
+              <a:t>Datenbank</a:t>
+            </a:r>
+            <a:endParaRPr lang="de-CH" dirty="0" smtClean="0"/>
+          </a:p>
+          <a:p>
+            <a:pPr lvl="1"/>
+            <a:r>
+              <a:rPr lang="de-CH" dirty="0" smtClean="0"/>
+              <a:t>Projektstruktur</a:t>
+            </a:r>
+          </a:p>
+          <a:p>
+            <a:pPr lvl="1"/>
+            <a:r>
+              <a:rPr lang="de-CH" dirty="0" smtClean="0"/>
+              <a:t>Tauschsystem</a:t>
+            </a:r>
+          </a:p>
+          <a:p>
+            <a:pPr lvl="1"/>
+            <a:r>
+              <a:rPr lang="de-CH" dirty="0" smtClean="0"/>
+              <a:t>Suche &amp; Navigation</a:t>
+            </a:r>
+            <a:endParaRPr lang="de-CH" dirty="0" smtClean="0"/>
+          </a:p>
+          <a:p>
+            <a:r>
+              <a:rPr lang="de-CH" dirty="0" smtClean="0"/>
+              <a:t>Demo</a:t>
+            </a:r>
+            <a:endParaRPr lang="de-CH" dirty="0" smtClean="0"/>
+          </a:p>
+          <a:p>
+            <a:r>
+              <a:rPr lang="de-CH" dirty="0" smtClean="0"/>
+              <a:t>Fragen</a:t>
+            </a:r>
+          </a:p>
+          <a:p>
+            <a:endParaRPr lang="de-CH" dirty="0" smtClean="0"/>
+          </a:p>
+        </p:txBody>
+      </p:sp>
+      <p:sp>
+        <p:nvSpPr>
+          <p:cNvPr id="3" name="Titel 2"/>
+          <p:cNvSpPr>
+            <a:spLocks noGrp="1"/>
+          </p:cNvSpPr>
+          <p:nvPr>
+            <p:ph type="title"/>
+          </p:nvPr>
+        </p:nvSpPr>
+        <p:spPr/>
+        <p:txBody>
+          <a:bodyPr/>
+          <a:lstStyle/>
+          <a:p>
+            <a:r>
+              <a:rPr lang="de-CH" dirty="0" smtClean="0"/>
+              <a:t>Überblick	</a:t>
+            </a:r>
+            <a:endParaRPr lang="en-GB" dirty="0"/>
+          </a:p>
+        </p:txBody>
+      </p:sp>
+    </p:spTree>
+  </p:cSld>
+  <p:clrMapOvr>
+    <a:masterClrMapping/>
+  </p:clrMapOvr>
+  <p:timing>
+    <p:tnLst>
+      <p:par>
+        <p:cTn id="1" dur="indefinite" restart="never" nodeType="tmRoot"/>
+      </p:par>
+    </p:tnLst>
+  </p:timing>
+</p:sld>
+</file>
+
+<file path=ppt/slides/slide3.xml><?xml version="1.0" encoding="utf-8"?>
+<p:sld xmlns:a="http://schemas.openxmlformats.org/drawingml/2006/main" xmlns:r="http://schemas.openxmlformats.org/officeDocument/2006/relationships" xmlns:p="http://schemas.openxmlformats.org/presentationml/2006/main">
+  <p:cSld>
+    <p:spTree>
+      <p:nvGrpSpPr>
+        <p:cNvPr id="1" name=""/>
+        <p:cNvGrpSpPr/>
+        <p:nvPr/>
+      </p:nvGrpSpPr>
+      <p:grpSpPr>
+        <a:xfrm>
+          <a:off x="0" y="0"/>
+          <a:ext cx="0" cy="0"/>
+          <a:chOff x="0" y="0"/>
+          <a:chExt cx="0" cy="0"/>
+        </a:xfrm>
+      </p:grpSpPr>
+      <p:sp>
+        <p:nvSpPr>
+          <p:cNvPr id="2" name="Inhaltsplatzhalter 1"/>
+          <p:cNvSpPr>
+            <a:spLocks noGrp="1"/>
+          </p:cNvSpPr>
+          <p:nvPr>
+            <p:ph idx="1"/>
+          </p:nvPr>
+        </p:nvSpPr>
+        <p:spPr/>
+        <p:txBody>
+          <a:bodyPr>
+            <a:normAutofit/>
+          </a:bodyPr>
+          <a:lstStyle/>
+          <a:p>
+            <a:r>
+              <a:rPr lang="de-CH" sz="2400" dirty="0" smtClean="0"/>
+              <a:t>Online Tausch- und Ausleihbörse für physische Objekte in der näheren Umgebung</a:t>
+            </a:r>
+          </a:p>
+          <a:p>
+            <a:endParaRPr lang="de-CH" sz="2400" dirty="0" smtClean="0"/>
+          </a:p>
+          <a:p>
+            <a:r>
+              <a:rPr lang="de-CH" sz="2400" dirty="0" smtClean="0"/>
+              <a:t>Zielgruppen</a:t>
+            </a:r>
+          </a:p>
+          <a:p>
+            <a:pPr lvl="1"/>
+            <a:r>
+              <a:rPr lang="de-CH" sz="2000" dirty="0" smtClean="0"/>
+              <a:t>Stadtbewohner</a:t>
+            </a:r>
+          </a:p>
+          <a:p>
+            <a:pPr lvl="2"/>
+            <a:r>
+              <a:rPr lang="de-CH" sz="1800" dirty="0" smtClean="0"/>
+              <a:t>Wohnt in dicht besiedeltem Gebiet</a:t>
+            </a:r>
+          </a:p>
+          <a:p>
+            <a:pPr lvl="2"/>
+            <a:r>
+              <a:rPr lang="de-CH" sz="1800" dirty="0" smtClean="0"/>
+              <a:t>Ökologisch bewusst, ökonomisch orientiert</a:t>
+            </a:r>
+          </a:p>
+          <a:p>
+            <a:pPr lvl="1"/>
+            <a:r>
+              <a:rPr lang="de-CH" sz="2000" dirty="0" smtClean="0"/>
+              <a:t>Sammler</a:t>
+            </a:r>
+          </a:p>
+          <a:p>
+            <a:pPr lvl="2"/>
+            <a:r>
+              <a:rPr lang="de-CH" sz="1800" dirty="0" smtClean="0"/>
+              <a:t>An Kollektionen interessiert.</a:t>
+            </a:r>
+            <a:endParaRPr lang="en-GB" sz="1800" dirty="0" smtClean="0"/>
+          </a:p>
+          <a:p>
+            <a:pPr lvl="2"/>
+            <a:r>
+              <a:rPr lang="de-CH" sz="1800" dirty="0" smtClean="0"/>
+              <a:t>Sucht Gegenstände mit niedriger Verfügbarkeit</a:t>
+            </a:r>
+          </a:p>
+        </p:txBody>
+      </p:sp>
+      <p:sp>
+        <p:nvSpPr>
+          <p:cNvPr id="3" name="Titel 2"/>
+          <p:cNvSpPr>
+            <a:spLocks noGrp="1"/>
+          </p:cNvSpPr>
+          <p:nvPr>
+            <p:ph type="title"/>
+          </p:nvPr>
+        </p:nvSpPr>
+        <p:spPr/>
+        <p:txBody>
+          <a:bodyPr/>
+          <a:lstStyle/>
+          <a:p>
+            <a:r>
+              <a:rPr lang="de-CH" dirty="0" smtClean="0"/>
+              <a:t>Idee</a:t>
+            </a:r>
+            <a:endParaRPr lang="en-GB" dirty="0"/>
+          </a:p>
+        </p:txBody>
+      </p:sp>
+    </p:spTree>
+  </p:cSld>
+  <p:clrMapOvr>
+    <a:masterClrMapping/>
+  </p:clrMapOvr>
+</p:sld>
+</file>
+
+<file path=ppt/slides/slide4.xml><?xml version="1.0" encoding="utf-8"?>
+<p:sld xmlns:a="http://schemas.openxmlformats.org/drawingml/2006/main" xmlns:r="http://schemas.openxmlformats.org/officeDocument/2006/relationships" xmlns:p="http://schemas.openxmlformats.org/presentationml/2006/main">
+  <p:cSld>
+    <p:spTree>
+      <p:nvGrpSpPr>
+        <p:cNvPr id="1" name=""/>
+        <p:cNvGrpSpPr/>
+        <p:nvPr/>
+      </p:nvGrpSpPr>
+      <p:grpSpPr>
+        <a:xfrm>
+          <a:off x="0" y="0"/>
+          <a:ext cx="0" cy="0"/>
+          <a:chOff x="0" y="0"/>
+          <a:chExt cx="0" cy="0"/>
+        </a:xfrm>
+      </p:grpSpPr>
+      <p:sp>
+        <p:nvSpPr>
+          <p:cNvPr id="2" name="Inhaltsplatzhalter 1"/>
+          <p:cNvSpPr>
+            <a:spLocks noGrp="1"/>
+          </p:cNvSpPr>
+          <p:nvPr>
+            <p:ph idx="1"/>
+          </p:nvPr>
+        </p:nvSpPr>
+        <p:spPr/>
+        <p:txBody>
+          <a:bodyPr/>
+          <a:lstStyle/>
+          <a:p>
+            <a:r>
               <a:rPr lang="de-CH" dirty="0" err="1" smtClean="0"/>
               <a:t>Scrum</a:t>
             </a:r>
@@ -4844,7 +5933,7 @@
 </p:sld>
 </file>
 
-<file path=ppt/slides/slide11.xml><?xml version="1.0" encoding="utf-8"?>
+<file path=ppt/slides/slide5.xml><?xml version="1.0" encoding="utf-8"?>
 <p:sld xmlns:a="http://schemas.openxmlformats.org/drawingml/2006/main" xmlns:r="http://schemas.openxmlformats.org/officeDocument/2006/relationships" xmlns:p="http://schemas.openxmlformats.org/presentationml/2006/main">
   <p:cSld>
     <p:spTree>
@@ -4863,12 +5952,12 @@
       </p:grpSpPr>
       <p:sp>
         <p:nvSpPr>
-          <p:cNvPr id="3" name="Titel 2"/>
-          <p:cNvSpPr>
-            <a:spLocks noGrp="1"/>
-          </p:cNvSpPr>
-          <p:nvPr>
-            <p:ph type="title"/>
+          <p:cNvPr id="2" name="Inhaltsplatzhalter 1"/>
+          <p:cNvSpPr>
+            <a:spLocks noGrp="1"/>
+          </p:cNvSpPr>
+          <p:nvPr>
+            <p:ph idx="1"/>
           </p:nvPr>
         </p:nvSpPr>
         <p:spPr/>
@@ -4878,7 +5967,92 @@
           <a:p>
             <a:r>
               <a:rPr lang="de-CH" dirty="0" smtClean="0"/>
-              <a:t>Fragen</a:t>
+              <a:t>Sprachen: 	JS, PHP, HTML, CSS</a:t>
+            </a:r>
+          </a:p>
+          <a:p>
+            <a:r>
+              <a:rPr lang="de-CH" dirty="0" smtClean="0"/>
+              <a:t>Software: 	XAMPP, </a:t>
+            </a:r>
+            <a:r>
+              <a:rPr lang="de-CH" dirty="0" err="1" smtClean="0"/>
+              <a:t>mySQL</a:t>
+            </a:r>
+            <a:r>
+              <a:rPr lang="de-CH" dirty="0" smtClean="0"/>
+              <a:t> </a:t>
+            </a:r>
+            <a:r>
+              <a:rPr lang="de-CH" dirty="0" err="1" smtClean="0"/>
+              <a:t>Workbench</a:t>
+            </a:r>
+            <a:r>
+              <a:rPr lang="de-CH" dirty="0" smtClean="0"/>
+              <a:t>, 			</a:t>
+            </a:r>
+            <a:r>
+              <a:rPr lang="de-CH" dirty="0" err="1" smtClean="0"/>
+              <a:t>ScrumDesk</a:t>
+            </a:r>
+            <a:endParaRPr lang="de-CH" dirty="0" smtClean="0"/>
+          </a:p>
+          <a:p>
+            <a:r>
+              <a:rPr lang="de-CH" dirty="0" smtClean="0"/>
+              <a:t>Libraries: 	</a:t>
+            </a:r>
+            <a:r>
+              <a:rPr lang="de-CH" dirty="0" err="1" smtClean="0"/>
+              <a:t>jQuery</a:t>
+            </a:r>
+            <a:r>
+              <a:rPr lang="de-CH" dirty="0" smtClean="0"/>
+              <a:t>, </a:t>
+            </a:r>
+            <a:r>
+              <a:rPr lang="de-CH" dirty="0" err="1" smtClean="0"/>
+              <a:t>Autoloader</a:t>
+            </a:r>
+            <a:endParaRPr lang="de-CH" dirty="0" smtClean="0"/>
+          </a:p>
+          <a:p>
+            <a:r>
+              <a:rPr lang="de-CH" dirty="0" smtClean="0"/>
+              <a:t>Webservice:	Google </a:t>
+            </a:r>
+            <a:r>
+              <a:rPr lang="de-CH" dirty="0" err="1" smtClean="0"/>
+              <a:t>Maps</a:t>
+            </a:r>
+            <a:r>
+              <a:rPr lang="de-CH" dirty="0" smtClean="0"/>
+              <a:t> API</a:t>
+            </a:r>
+          </a:p>
+          <a:p>
+            <a:endParaRPr lang="en-GB" dirty="0"/>
+          </a:p>
+        </p:txBody>
+      </p:sp>
+      <p:sp>
+        <p:nvSpPr>
+          <p:cNvPr id="3" name="Titel 2"/>
+          <p:cNvSpPr>
+            <a:spLocks noGrp="1"/>
+          </p:cNvSpPr>
+          <p:nvPr>
+            <p:ph type="title"/>
+          </p:nvPr>
+        </p:nvSpPr>
+        <p:spPr/>
+        <p:txBody>
+          <a:bodyPr/>
+          <a:lstStyle/>
+          <a:p>
+            <a:r>
+              <a:rPr lang="de-CH" dirty="0" smtClean="0"/>
+              <a:t>Technologien</a:t>
             </a:r>
             <a:endParaRPr lang="en-GB" dirty="0"/>
           </a:p>
@@ -4892,7 +6066,7 @@
 </p:sld>
 </file>
 
-<file path=ppt/slides/slide2.xml><?xml version="1.0" encoding="utf-8"?>
+<file path=ppt/slides/slide6.xml><?xml version="1.0" encoding="utf-8"?>
 <p:sld xmlns:a="http://schemas.openxmlformats.org/drawingml/2006/main" xmlns:r="http://schemas.openxmlformats.org/officeDocument/2006/relationships" xmlns:p="http://schemas.openxmlformats.org/presentationml/2006/main">
   <p:cSld>
     <p:spTree>
@@ -4925,54 +6099,48 @@
           <a:lstStyle/>
           <a:p>
             <a:r>
+              <a:rPr lang="de-CH" dirty="0"/>
+              <a:t>Eigene Datenbankzugriffsklasse und Mapper</a:t>
+            </a:r>
+          </a:p>
+          <a:p>
+            <a:r>
               <a:rPr lang="de-CH" dirty="0" smtClean="0"/>
-              <a:t>Idee</a:t>
-            </a:r>
-          </a:p>
-          <a:p>
+              <a:t>Eigenes </a:t>
+            </a:r>
             <a:r>
               <a:rPr lang="de-CH" dirty="0" smtClean="0"/>
-              <a:t>Technologien</a:t>
+              <a:t>MVC-Framework</a:t>
             </a:r>
           </a:p>
           <a:p>
             <a:r>
               <a:rPr lang="de-CH" dirty="0" smtClean="0"/>
-              <a:t>Dateistruktur</a:t>
-            </a:r>
-          </a:p>
-          <a:p>
+              <a:t>Austausch </a:t>
+            </a:r>
+            <a:r>
+              <a:rPr lang="de-CH" dirty="0"/>
+              <a:t>zwischen </a:t>
+            </a:r>
             <a:r>
               <a:rPr lang="de-CH" dirty="0" smtClean="0"/>
-              <a:t>Datenbank</a:t>
+              <a:t>Nutzern</a:t>
             </a:r>
           </a:p>
           <a:p>
             <a:r>
               <a:rPr lang="de-CH" dirty="0" smtClean="0"/>
-              <a:t>Design</a:t>
+              <a:t>Dynamische Navigation anhand Kategorien</a:t>
             </a:r>
           </a:p>
           <a:p>
             <a:r>
               <a:rPr lang="de-CH" dirty="0" smtClean="0"/>
-              <a:t>Demo der Features</a:t>
-            </a:r>
-          </a:p>
-          <a:p>
-            <a:r>
-              <a:rPr lang="de-CH" dirty="0" smtClean="0"/>
-              <a:t>Zusammenarbeit</a:t>
-            </a:r>
-          </a:p>
-          <a:p>
-            <a:r>
-              <a:rPr lang="de-CH" dirty="0" smtClean="0"/>
-              <a:t>Fragen</a:t>
-            </a:r>
-          </a:p>
-          <a:p>
-            <a:endParaRPr lang="de-CH" dirty="0" smtClean="0"/>
+              <a:t>Dynamische Navigation anhand Umkreissuche</a:t>
+            </a:r>
+          </a:p>
+          <a:p>
+            <a:endParaRPr lang="en-GB" dirty="0"/>
           </a:p>
         </p:txBody>
       </p:sp>
@@ -4993,7 +6161,15 @@
           <a:p>
             <a:r>
               <a:rPr lang="de-CH" dirty="0" smtClean="0"/>
-              <a:t>Überblick	</a:t>
+              <a:t>Key </a:t>
+            </a:r>
+            <a:r>
+              <a:rPr lang="de-CH" dirty="0"/>
+              <a:t>E</a:t>
+            </a:r>
+            <a:r>
+              <a:rPr lang="de-CH" dirty="0" smtClean="0"/>
+              <a:t>lements</a:t>
             </a:r>
             <a:endParaRPr lang="en-GB" dirty="0"/>
           </a:p>
@@ -5004,17 +6180,10 @@
   <p:clrMapOvr>
     <a:masterClrMapping/>
   </p:clrMapOvr>
-  <p:timing>
-    <p:tnLst>
-      <p:par>
-        <p:cTn id="1" dur="indefinite" restart="never" nodeType="tmRoot"/>
-      </p:par>
-    </p:tnLst>
-  </p:timing>
 </p:sld>
 </file>
 
-<file path=ppt/slides/slide3.xml><?xml version="1.0" encoding="utf-8"?>
+<file path=ppt/slides/slide7.xml><?xml version="1.0" encoding="utf-8"?>
 <p:sld xmlns:a="http://schemas.openxmlformats.org/drawingml/2006/main" xmlns:r="http://schemas.openxmlformats.org/officeDocument/2006/relationships" xmlns:p="http://schemas.openxmlformats.org/presentationml/2006/main">
   <p:cSld>
     <p:spTree>
@@ -5033,82 +6202,6 @@
       </p:grpSpPr>
       <p:sp>
         <p:nvSpPr>
-          <p:cNvPr id="2" name="Inhaltsplatzhalter 1"/>
-          <p:cNvSpPr>
-            <a:spLocks noGrp="1"/>
-          </p:cNvSpPr>
-          <p:nvPr>
-            <p:ph idx="1"/>
-          </p:nvPr>
-        </p:nvSpPr>
-        <p:spPr/>
-        <p:txBody>
-          <a:bodyPr>
-            <a:normAutofit/>
-          </a:bodyPr>
-          <a:lstStyle/>
-          <a:p>
-            <a:r>
-              <a:rPr lang="de-CH" sz="2400" dirty="0" smtClean="0"/>
-              <a:t>Online Tausch- und Ausleihbörse für physische Objekte in der näheren Umgebung</a:t>
-            </a:r>
-          </a:p>
-          <a:p>
-            <a:endParaRPr lang="de-CH" sz="2400" dirty="0" smtClean="0"/>
-          </a:p>
-          <a:p>
-            <a:r>
-              <a:rPr lang="de-CH" sz="2400" dirty="0" smtClean="0"/>
-              <a:t>Zielgruppen</a:t>
-            </a:r>
-          </a:p>
-          <a:p>
-            <a:pPr lvl="1"/>
-            <a:r>
-              <a:rPr lang="de-CH" sz="2000" dirty="0" smtClean="0"/>
-              <a:t>Stadtbewohner</a:t>
-            </a:r>
-          </a:p>
-          <a:p>
-            <a:pPr lvl="2"/>
-            <a:r>
-              <a:rPr lang="de-CH" sz="1800" dirty="0" smtClean="0"/>
-              <a:t>Wohnt in dicht besiedeltem Gebiet</a:t>
-            </a:r>
-          </a:p>
-          <a:p>
-            <a:pPr lvl="2"/>
-            <a:r>
-              <a:rPr lang="de-CH" sz="1800" dirty="0" smtClean="0"/>
-              <a:t>Ökologisch bewusst, ökonomisch orientiert</a:t>
-            </a:r>
-          </a:p>
-          <a:p>
-            <a:pPr lvl="1"/>
-            <a:r>
-              <a:rPr lang="de-CH" sz="2000" dirty="0" smtClean="0"/>
-              <a:t>Sammler</a:t>
-            </a:r>
-          </a:p>
-          <a:p>
-            <a:pPr lvl="2"/>
-            <a:r>
-              <a:rPr lang="de-CH" sz="1800" dirty="0" smtClean="0"/>
-              <a:t>An Kollektionen interessiert.</a:t>
-            </a:r>
-            <a:endParaRPr lang="en-GB" sz="1800" dirty="0" smtClean="0"/>
-          </a:p>
-          <a:p>
-            <a:pPr lvl="2"/>
-            <a:r>
-              <a:rPr lang="de-CH" sz="1800" dirty="0" smtClean="0"/>
-              <a:t>Sucht Gegenstände mit niedriger Verfügbarkeit</a:t>
-            </a:r>
-          </a:p>
-        </p:txBody>
-      </p:sp>
-      <p:sp>
-        <p:nvSpPr>
           <p:cNvPr id="3" name="Titel 2"/>
           <p:cNvSpPr>
             <a:spLocks noGrp="1"/>
@@ -5124,154 +6217,65 @@
           <a:p>
             <a:r>
               <a:rPr lang="de-CH" dirty="0" smtClean="0"/>
-              <a:t>Idee</a:t>
+              <a:t>Datenbank</a:t>
             </a:r>
             <a:endParaRPr lang="en-GB" dirty="0"/>
           </a:p>
         </p:txBody>
       </p:sp>
+      <p:pic>
+        <p:nvPicPr>
+          <p:cNvPr id="1026" name="Picture 2"/>
+          <p:cNvPicPr>
+            <a:picLocks noChangeAspect="1" noChangeArrowheads="1"/>
+          </p:cNvPicPr>
+          <p:nvPr/>
+        </p:nvPicPr>
+        <p:blipFill>
+          <a:blip r:embed="rId2" cstate="print"/>
+          <a:srcRect/>
+          <a:stretch>
+            <a:fillRect/>
+          </a:stretch>
+        </p:blipFill>
+        <p:spPr bwMode="auto">
+          <a:xfrm>
+            <a:off x="1187624" y="1124744"/>
+            <a:ext cx="7715250" cy="4933950"/>
+          </a:xfrm>
+          <a:prstGeom prst="rect">
+            <a:avLst/>
+          </a:prstGeom>
+          <a:noFill/>
+          <a:ln w="9525">
+            <a:noFill/>
+            <a:miter lim="800000"/>
+            <a:headEnd/>
+            <a:tailEnd/>
+          </a:ln>
+        </p:spPr>
+      </p:pic>
     </p:spTree>
+    <p:extLst>
+      <p:ext uri="{BB962C8B-B14F-4D97-AF65-F5344CB8AC3E}">
+        <p14:creationId xmlns:p14="http://schemas.microsoft.com/office/powerpoint/2010/main" xmlns="" val="3818205748"/>
+      </p:ext>
+    </p:extLst>
   </p:cSld>
   <p:clrMapOvr>
     <a:masterClrMapping/>
   </p:clrMapOvr>
+  <p:timing>
+    <p:tnLst>
+      <p:par>
+        <p:cTn id="1" dur="indefinite" restart="never" nodeType="tmRoot"/>
+      </p:par>
+    </p:tnLst>
+  </p:timing>
 </p:sld>
 </file>
 
-<file path=ppt/slides/slide4.xml><?xml version="1.0" encoding="utf-8"?>
-<p:sld xmlns:a="http://schemas.openxmlformats.org/drawingml/2006/main" xmlns:r="http://schemas.openxmlformats.org/officeDocument/2006/relationships" xmlns:p="http://schemas.openxmlformats.org/presentationml/2006/main">
-  <p:cSld>
-    <p:spTree>
-      <p:nvGrpSpPr>
-        <p:cNvPr id="1" name=""/>
-        <p:cNvGrpSpPr/>
-        <p:nvPr/>
-      </p:nvGrpSpPr>
-      <p:grpSpPr>
-        <a:xfrm>
-          <a:off x="0" y="0"/>
-          <a:ext cx="0" cy="0"/>
-          <a:chOff x="0" y="0"/>
-          <a:chExt cx="0" cy="0"/>
-        </a:xfrm>
-      </p:grpSpPr>
-      <p:sp>
-        <p:nvSpPr>
-          <p:cNvPr id="2" name="Inhaltsplatzhalter 1"/>
-          <p:cNvSpPr>
-            <a:spLocks noGrp="1"/>
-          </p:cNvSpPr>
-          <p:nvPr>
-            <p:ph idx="1"/>
-          </p:nvPr>
-        </p:nvSpPr>
-        <p:spPr/>
-        <p:txBody>
-          <a:bodyPr/>
-          <a:lstStyle/>
-          <a:p>
-            <a:r>
-              <a:rPr lang="de-CH" dirty="0" smtClean="0"/>
-              <a:t>Sprachen: 	JS, PHP, HTML, CSS</a:t>
-            </a:r>
-          </a:p>
-          <a:p>
-            <a:r>
-              <a:rPr lang="de-CH" dirty="0" smtClean="0"/>
-              <a:t>Software: 	XAMPP, </a:t>
-            </a:r>
-            <a:r>
-              <a:rPr lang="de-CH" dirty="0" err="1" smtClean="0"/>
-              <a:t>mySQL</a:t>
-            </a:r>
-            <a:r>
-              <a:rPr lang="de-CH" dirty="0" smtClean="0"/>
-              <a:t> </a:t>
-            </a:r>
-            <a:r>
-              <a:rPr lang="de-CH" dirty="0" err="1" smtClean="0"/>
-              <a:t>Workbench</a:t>
-            </a:r>
-            <a:r>
-              <a:rPr lang="de-CH" dirty="0" smtClean="0"/>
-              <a:t>, 			</a:t>
-            </a:r>
-            <a:r>
-              <a:rPr lang="de-CH" dirty="0" err="1" smtClean="0"/>
-              <a:t>ScrumDesk</a:t>
-            </a:r>
-            <a:endParaRPr lang="de-CH" dirty="0" smtClean="0"/>
-          </a:p>
-          <a:p>
-            <a:r>
-              <a:rPr lang="de-CH" dirty="0" smtClean="0"/>
-              <a:t>Libraries: 	</a:t>
-            </a:r>
-            <a:r>
-              <a:rPr lang="de-CH" dirty="0" err="1" smtClean="0"/>
-              <a:t>jQuery</a:t>
-            </a:r>
-            <a:r>
-              <a:rPr lang="de-CH" dirty="0" smtClean="0"/>
-              <a:t>, </a:t>
-            </a:r>
-            <a:r>
-              <a:rPr lang="de-CH" dirty="0" err="1" smtClean="0"/>
-              <a:t>Autoloader</a:t>
-            </a:r>
-            <a:endParaRPr lang="de-CH" dirty="0" smtClean="0"/>
-          </a:p>
-          <a:p>
-            <a:r>
-              <a:rPr lang="de-CH" dirty="0" smtClean="0"/>
-              <a:t>Webservice:	Google </a:t>
-            </a:r>
-            <a:r>
-              <a:rPr lang="de-CH" dirty="0" err="1" smtClean="0"/>
-              <a:t>Maps</a:t>
-            </a:r>
-            <a:r>
-              <a:rPr lang="de-CH" dirty="0" smtClean="0"/>
-              <a:t> API</a:t>
-            </a:r>
-          </a:p>
-          <a:p>
-            <a:endParaRPr lang="en-GB" dirty="0"/>
-          </a:p>
-        </p:txBody>
-      </p:sp>
-      <p:sp>
-        <p:nvSpPr>
-          <p:cNvPr id="3" name="Titel 2"/>
-          <p:cNvSpPr>
-            <a:spLocks noGrp="1"/>
-          </p:cNvSpPr>
-          <p:nvPr>
-            <p:ph type="title"/>
-          </p:nvPr>
-        </p:nvSpPr>
-        <p:spPr/>
-        <p:txBody>
-          <a:bodyPr/>
-          <a:lstStyle/>
-          <a:p>
-            <a:r>
-              <a:rPr lang="de-CH" dirty="0" smtClean="0"/>
-              <a:t>Technologien</a:t>
-            </a:r>
-            <a:endParaRPr lang="en-GB" dirty="0"/>
-          </a:p>
-        </p:txBody>
-      </p:sp>
-    </p:spTree>
-  </p:cSld>
-  <p:clrMapOvr>
-    <a:masterClrMapping/>
-  </p:clrMapOvr>
-</p:sld>
-</file>
-
-<file path=ppt/slides/slide5.xml><?xml version="1.0" encoding="utf-8"?>
+<file path=ppt/slides/slide8.xml><?xml version="1.0" encoding="utf-8"?>
 <p:sld xmlns:a="http://schemas.openxmlformats.org/drawingml/2006/main" xmlns:r="http://schemas.openxmlformats.org/officeDocument/2006/relationships" xmlns:p="http://schemas.openxmlformats.org/presentationml/2006/main">
   <p:cSld>
     <p:spTree>
@@ -5385,223 +6389,6 @@
 </p:sld>
 </file>
 
-<file path=ppt/slides/slide6.xml><?xml version="1.0" encoding="utf-8"?>
-<p:sld xmlns:a="http://schemas.openxmlformats.org/drawingml/2006/main" xmlns:r="http://schemas.openxmlformats.org/officeDocument/2006/relationships" xmlns:p="http://schemas.openxmlformats.org/presentationml/2006/main">
-  <p:cSld>
-    <p:spTree>
-      <p:nvGrpSpPr>
-        <p:cNvPr id="1" name=""/>
-        <p:cNvGrpSpPr/>
-        <p:nvPr/>
-      </p:nvGrpSpPr>
-      <p:grpSpPr>
-        <a:xfrm>
-          <a:off x="0" y="0"/>
-          <a:ext cx="0" cy="0"/>
-          <a:chOff x="0" y="0"/>
-          <a:chExt cx="0" cy="0"/>
-        </a:xfrm>
-      </p:grpSpPr>
-      <p:sp>
-        <p:nvSpPr>
-          <p:cNvPr id="2" name="Inhaltsplatzhalter 1"/>
-          <p:cNvSpPr>
-            <a:spLocks noGrp="1"/>
-          </p:cNvSpPr>
-          <p:nvPr>
-            <p:ph idx="1"/>
-          </p:nvPr>
-        </p:nvSpPr>
-        <p:spPr/>
-        <p:txBody>
-          <a:bodyPr/>
-          <a:lstStyle/>
-          <a:p>
-            <a:r>
-              <a:rPr lang="de-CH" dirty="0" smtClean="0"/>
-              <a:t>Hier kommt das Schema</a:t>
-            </a:r>
-            <a:endParaRPr lang="en-GB" dirty="0"/>
-          </a:p>
-        </p:txBody>
-      </p:sp>
-      <p:sp>
-        <p:nvSpPr>
-          <p:cNvPr id="3" name="Titel 2"/>
-          <p:cNvSpPr>
-            <a:spLocks noGrp="1"/>
-          </p:cNvSpPr>
-          <p:nvPr>
-            <p:ph type="title"/>
-          </p:nvPr>
-        </p:nvSpPr>
-        <p:spPr/>
-        <p:txBody>
-          <a:bodyPr/>
-          <a:lstStyle/>
-          <a:p>
-            <a:r>
-              <a:rPr lang="de-CH" dirty="0" smtClean="0"/>
-              <a:t>Datenbank</a:t>
-            </a:r>
-            <a:endParaRPr lang="en-GB" dirty="0"/>
-          </a:p>
-        </p:txBody>
-      </p:sp>
-    </p:spTree>
-  </p:cSld>
-  <p:clrMapOvr>
-    <a:masterClrMapping/>
-  </p:clrMapOvr>
-</p:sld>
-</file>
-
-<file path=ppt/slides/slide7.xml><?xml version="1.0" encoding="utf-8"?>
-<p:sld xmlns:a="http://schemas.openxmlformats.org/drawingml/2006/main" xmlns:r="http://schemas.openxmlformats.org/officeDocument/2006/relationships" xmlns:p="http://schemas.openxmlformats.org/presentationml/2006/main">
-  <p:cSld>
-    <p:spTree>
-      <p:nvGrpSpPr>
-        <p:cNvPr id="1" name=""/>
-        <p:cNvGrpSpPr/>
-        <p:nvPr/>
-      </p:nvGrpSpPr>
-      <p:grpSpPr>
-        <a:xfrm>
-          <a:off x="0" y="0"/>
-          <a:ext cx="0" cy="0"/>
-          <a:chOff x="0" y="0"/>
-          <a:chExt cx="0" cy="0"/>
-        </a:xfrm>
-      </p:grpSpPr>
-      <p:sp>
-        <p:nvSpPr>
-          <p:cNvPr id="2" name="Inhaltsplatzhalter 1"/>
-          <p:cNvSpPr>
-            <a:spLocks noGrp="1"/>
-          </p:cNvSpPr>
-          <p:nvPr>
-            <p:ph idx="1"/>
-          </p:nvPr>
-        </p:nvSpPr>
-        <p:spPr/>
-        <p:txBody>
-          <a:bodyPr/>
-          <a:lstStyle/>
-          <a:p>
-            <a:r>
-              <a:rPr lang="de-CH" dirty="0" smtClean="0"/>
-              <a:t>Hier kommt der Seitenaufbau</a:t>
-            </a:r>
-            <a:endParaRPr lang="en-GB" dirty="0"/>
-          </a:p>
-        </p:txBody>
-      </p:sp>
-      <p:sp>
-        <p:nvSpPr>
-          <p:cNvPr id="3" name="Titel 2"/>
-          <p:cNvSpPr>
-            <a:spLocks noGrp="1"/>
-          </p:cNvSpPr>
-          <p:nvPr>
-            <p:ph type="title"/>
-          </p:nvPr>
-        </p:nvSpPr>
-        <p:spPr/>
-        <p:txBody>
-          <a:bodyPr/>
-          <a:lstStyle/>
-          <a:p>
-            <a:r>
-              <a:rPr lang="de-CH" dirty="0" smtClean="0"/>
-              <a:t>Design</a:t>
-            </a:r>
-            <a:endParaRPr lang="en-GB" dirty="0"/>
-          </a:p>
-        </p:txBody>
-      </p:sp>
-    </p:spTree>
-  </p:cSld>
-  <p:clrMapOvr>
-    <a:masterClrMapping/>
-  </p:clrMapOvr>
-</p:sld>
-</file>
-
-<file path=ppt/slides/slide8.xml><?xml version="1.0" encoding="utf-8"?>
-<p:sld xmlns:a="http://schemas.openxmlformats.org/drawingml/2006/main" xmlns:r="http://schemas.openxmlformats.org/officeDocument/2006/relationships" xmlns:p="http://schemas.openxmlformats.org/presentationml/2006/main">
-  <p:cSld>
-    <p:spTree>
-      <p:nvGrpSpPr>
-        <p:cNvPr id="1" name=""/>
-        <p:cNvGrpSpPr/>
-        <p:nvPr/>
-      </p:nvGrpSpPr>
-      <p:grpSpPr>
-        <a:xfrm>
-          <a:off x="0" y="0"/>
-          <a:ext cx="0" cy="0"/>
-          <a:chOff x="0" y="0"/>
-          <a:chExt cx="0" cy="0"/>
-        </a:xfrm>
-      </p:grpSpPr>
-      <p:sp>
-        <p:nvSpPr>
-          <p:cNvPr id="2" name="Inhaltsplatzhalter 1"/>
-          <p:cNvSpPr>
-            <a:spLocks noGrp="1"/>
-          </p:cNvSpPr>
-          <p:nvPr>
-            <p:ph idx="1"/>
-          </p:nvPr>
-        </p:nvSpPr>
-        <p:spPr/>
-        <p:txBody>
-          <a:bodyPr/>
-          <a:lstStyle/>
-          <a:p>
-            <a:r>
-              <a:rPr lang="de-CH" dirty="0" smtClean="0"/>
-              <a:t>Routing, </a:t>
-            </a:r>
-            <a:r>
-              <a:rPr lang="de-CH" dirty="0" err="1" smtClean="0"/>
-              <a:t>Templating</a:t>
-            </a:r>
-            <a:r>
-              <a:rPr lang="de-CH" dirty="0" smtClean="0"/>
-              <a:t> oder Implementierung der Features zeigen?</a:t>
-            </a:r>
-            <a:endParaRPr lang="en-GB" dirty="0"/>
-          </a:p>
-        </p:txBody>
-      </p:sp>
-      <p:sp>
-        <p:nvSpPr>
-          <p:cNvPr id="3" name="Titel 2"/>
-          <p:cNvSpPr>
-            <a:spLocks noGrp="1"/>
-          </p:cNvSpPr>
-          <p:nvPr>
-            <p:ph type="title"/>
-          </p:nvPr>
-        </p:nvSpPr>
-        <p:spPr/>
-        <p:txBody>
-          <a:bodyPr/>
-          <a:lstStyle/>
-          <a:p>
-            <a:endParaRPr lang="en-GB" dirty="0"/>
-          </a:p>
-        </p:txBody>
-      </p:sp>
-    </p:spTree>
-  </p:cSld>
-  <p:clrMapOvr>
-    <a:masterClrMapping/>
-  </p:clrMapOvr>
-</p:sld>
-</file>
-
 <file path=ppt/slides/slide9.xml><?xml version="1.0" encoding="utf-8"?>
 <p:sld xmlns:a="http://schemas.openxmlformats.org/drawingml/2006/main" xmlns:r="http://schemas.openxmlformats.org/officeDocument/2006/relationships" xmlns:p="http://schemas.openxmlformats.org/presentationml/2006/main">
   <p:cSld>
@@ -5621,12 +6408,12 @@
       </p:grpSpPr>
       <p:sp>
         <p:nvSpPr>
-          <p:cNvPr id="2" name="Inhaltsplatzhalter 1"/>
-          <p:cNvSpPr>
-            <a:spLocks noGrp="1"/>
-          </p:cNvSpPr>
-          <p:nvPr>
-            <p:ph idx="1"/>
+          <p:cNvPr id="3" name="Titel 2"/>
+          <p:cNvSpPr>
+            <a:spLocks noGrp="1"/>
+          </p:cNvSpPr>
+          <p:nvPr>
+            <p:ph type="title"/>
           </p:nvPr>
         </p:nvSpPr>
         <p:spPr/>
@@ -5636,75 +6423,53 @@
           <a:p>
             <a:r>
               <a:rPr lang="de-CH" dirty="0" smtClean="0"/>
-              <a:t>Hier zeigen wir die Features</a:t>
-            </a:r>
-          </a:p>
-          <a:p>
-            <a:pPr lvl="1"/>
-            <a:r>
-              <a:rPr lang="de-CH" dirty="0" smtClean="0"/>
-              <a:t>Registrierung</a:t>
-            </a:r>
-          </a:p>
-          <a:p>
-            <a:pPr lvl="1"/>
-            <a:r>
-              <a:rPr lang="de-CH" dirty="0" smtClean="0"/>
-              <a:t>Produkt-Upload</a:t>
-            </a:r>
-          </a:p>
-          <a:p>
-            <a:pPr lvl="1"/>
-            <a:r>
-              <a:rPr lang="de-CH" dirty="0" smtClean="0"/>
-              <a:t>Umkreissuche</a:t>
-            </a:r>
-            <a:endParaRPr lang="en-GB" dirty="0" smtClean="0"/>
-          </a:p>
-          <a:p>
-            <a:pPr lvl="1"/>
-            <a:r>
-              <a:rPr lang="de-CH" dirty="0" smtClean="0"/>
               <a:t>Tausch</a:t>
             </a:r>
-          </a:p>
-          <a:p>
-            <a:pPr lvl="1"/>
-            <a:r>
-              <a:rPr lang="de-CH" dirty="0" smtClean="0"/>
-              <a:t>Bewertung</a:t>
-            </a:r>
-          </a:p>
-        </p:txBody>
-      </p:sp>
-      <p:sp>
-        <p:nvSpPr>
-          <p:cNvPr id="3" name="Titel 2"/>
-          <p:cNvSpPr>
-            <a:spLocks noGrp="1"/>
-          </p:cNvSpPr>
-          <p:nvPr>
-            <p:ph type="title"/>
-          </p:nvPr>
-        </p:nvSpPr>
-        <p:spPr/>
-        <p:txBody>
-          <a:bodyPr/>
-          <a:lstStyle/>
-          <a:p>
-            <a:r>
-              <a:rPr lang="de-CH" dirty="0" smtClean="0"/>
-              <a:t>Demo</a:t>
-            </a:r>
             <a:endParaRPr lang="en-GB" dirty="0"/>
           </a:p>
         </p:txBody>
       </p:sp>
+      <p:pic>
+        <p:nvPicPr>
+          <p:cNvPr id="5" name="Inhaltsplatzhalter 4"/>
+          <p:cNvPicPr>
+            <a:picLocks noGrp="1" noChangeAspect="1"/>
+          </p:cNvPicPr>
+          <p:nvPr>
+            <p:ph idx="1"/>
+          </p:nvPr>
+        </p:nvPicPr>
+        <p:blipFill>
+          <a:blip r:embed="rId2" cstate="print">
+            <a:extLst>
+              <a:ext uri="{28A0092B-C50C-407E-A947-70E740481C1C}">
+                <a14:useLocalDpi xmlns:a14="http://schemas.microsoft.com/office/drawing/2010/main" xmlns="" val="0"/>
+              </a:ext>
+            </a:extLst>
+          </a:blip>
+          <a:stretch>
+            <a:fillRect/>
+          </a:stretch>
+        </p:blipFill>
+        <p:spPr>
+          <a:xfrm>
+            <a:off x="1393231" y="1481138"/>
+            <a:ext cx="6357538" cy="4525962"/>
+          </a:xfrm>
+        </p:spPr>
+      </p:pic>
     </p:spTree>
   </p:cSld>
   <p:clrMapOvr>
     <a:masterClrMapping/>
   </p:clrMapOvr>
+  <p:timing>
+    <p:tnLst>
+      <p:par>
+        <p:cTn id="1" dur="indefinite" restart="never" nodeType="tmRoot"/>
+      </p:par>
+    </p:tnLst>
+  </p:timing>
 </p:sld>
 </file>
 
@@ -5991,4 +6756,287 @@
   <a:objectDefaults/>
   <a:extraClrSchemeLst/>
 </a:theme>
+</file>
+
+<file path=ppt/theme/theme2.xml><?xml version="1.0" encoding="utf-8"?>
+<a:theme xmlns:a="http://schemas.openxmlformats.org/drawingml/2006/main" name="Larissa-Design">
+  <a:themeElements>
+    <a:clrScheme name="Larissa">
+      <a:dk1>
+        <a:sysClr val="windowText" lastClr="000000"/>
+      </a:dk1>
+      <a:lt1>
+        <a:sysClr val="window" lastClr="FFFFFF"/>
+      </a:lt1>
+      <a:dk2>
+        <a:srgbClr val="1F497D"/>
+      </a:dk2>
+      <a:lt2>
+        <a:srgbClr val="EEECE1"/>
+      </a:lt2>
+      <a:accent1>
+        <a:srgbClr val="4F81BD"/>
+      </a:accent1>
+      <a:accent2>
+        <a:srgbClr val="C0504D"/>
+      </a:accent2>
+      <a:accent3>
+        <a:srgbClr val="9BBB59"/>
+      </a:accent3>
+      <a:accent4>
+        <a:srgbClr val="8064A2"/>
+      </a:accent4>
+      <a:accent5>
+        <a:srgbClr val="4BACC6"/>
+      </a:accent5>
+      <a:accent6>
+        <a:srgbClr val="F79646"/>
+      </a:accent6>
+      <a:hlink>
+        <a:srgbClr val="0000FF"/>
+      </a:hlink>
+      <a:folHlink>
+        <a:srgbClr val="800080"/>
+      </a:folHlink>
+    </a:clrScheme>
+    <a:fontScheme name="Larissa">
+      <a:majorFont>
+        <a:latin typeface="Calibri"/>
+        <a:ea typeface=""/>
+        <a:cs typeface=""/>
+        <a:font script="Jpan" typeface="ＭＳ Ｐゴシック"/>
+        <a:font script="Hang" typeface="맑은 고딕"/>
+        <a:font script="Hans" typeface="宋体"/>
+        <a:font script="Hant" typeface="新細明體"/>
+        <a:font script="Arab" typeface="Times New Roman"/>
+        <a:font script="Hebr" typeface="Times New Roman"/>
+        <a:font script="Thai" typeface="Angsana New"/>
+        <a:font script="Ethi" typeface="Nyala"/>
+        <a:font script="Beng" typeface="Vrinda"/>
+        <a:font script="Gujr" typeface="Shruti"/>
+        <a:font script="Khmr" typeface="MoolBoran"/>
+        <a:font script="Knda" typeface="Tunga"/>
+        <a:font script="Guru" typeface="Raavi"/>
+        <a:font script="Cans" typeface="Euphemia"/>
+        <a:font script="Cher" typeface="Plantagenet Cherokee"/>
+        <a:font script="Yiii" typeface="Microsoft Yi Baiti"/>
+        <a:font script="Tibt" typeface="Microsoft Himalaya"/>
+        <a:font script="Thaa" typeface="MV Boli"/>
+        <a:font script="Deva" typeface="Mangal"/>
+        <a:font script="Telu" typeface="Gautami"/>
+        <a:font script="Taml" typeface="Latha"/>
+        <a:font script="Syrc" typeface="Estrangelo Edessa"/>
+        <a:font script="Orya" typeface="Kalinga"/>
+        <a:font script="Mlym" typeface="Kartika"/>
+        <a:font script="Laoo" typeface="DokChampa"/>
+        <a:font script="Sinh" typeface="Iskoola Pota"/>
+        <a:font script="Mong" typeface="Mongolian Baiti"/>
+        <a:font script="Viet" typeface="Times New Roman"/>
+        <a:font script="Uigh" typeface="Microsoft Uighur"/>
+      </a:majorFont>
+      <a:minorFont>
+        <a:latin typeface="Calibri"/>
+        <a:ea typeface=""/>
+        <a:cs typeface=""/>
+        <a:font script="Jpan" typeface="ＭＳ Ｐゴシック"/>
+        <a:font script="Hang" typeface="맑은 고딕"/>
+        <a:font script="Hans" typeface="宋体"/>
+        <a:font script="Hant" typeface="新細明體"/>
+        <a:font script="Arab" typeface="Arial"/>
+        <a:font script="Hebr" typeface="Arial"/>
+        <a:font script="Thai" typeface="Cordia New"/>
+        <a:font script="Ethi" typeface="Nyala"/>
+        <a:font script="Beng" typeface="Vrinda"/>
+        <a:font script="Gujr" typeface="Shruti"/>
+        <a:font script="Khmr" typeface="DaunPenh"/>
+        <a:font script="Knda" typeface="Tunga"/>
+        <a:font script="Guru" typeface="Raavi"/>
+        <a:font script="Cans" typeface="Euphemia"/>
+        <a:font script="Cher" typeface="Plantagenet Cherokee"/>
+        <a:font script="Yiii" typeface="Microsoft Yi Baiti"/>
+        <a:font script="Tibt" typeface="Microsoft Himalaya"/>
+        <a:font script="Thaa" typeface="MV Boli"/>
+        <a:font script="Deva" typeface="Mangal"/>
+        <a:font script="Telu" typeface="Gautami"/>
+        <a:font script="Taml" typeface="Latha"/>
+        <a:font script="Syrc" typeface="Estrangelo Edessa"/>
+        <a:font script="Orya" typeface="Kalinga"/>
+        <a:font script="Mlym" typeface="Kartika"/>
+        <a:font script="Laoo" typeface="DokChampa"/>
+        <a:font script="Sinh" typeface="Iskoola Pota"/>
+        <a:font script="Mong" typeface="Mongolian Baiti"/>
+        <a:font script="Viet" typeface="Arial"/>
+        <a:font script="Uigh" typeface="Microsoft Uighur"/>
+      </a:minorFont>
+    </a:fontScheme>
+    <a:fmtScheme name="Larissa">
+      <a:fillStyleLst>
+        <a:solidFill>
+          <a:schemeClr val="phClr"/>
+        </a:solidFill>
+        <a:gradFill rotWithShape="1">
+          <a:gsLst>
+            <a:gs pos="0">
+              <a:schemeClr val="phClr">
+                <a:tint val="50000"/>
+                <a:satMod val="300000"/>
+              </a:schemeClr>
+            </a:gs>
+            <a:gs pos="35000">
+              <a:schemeClr val="phClr">
+                <a:tint val="37000"/>
+                <a:satMod val="300000"/>
+              </a:schemeClr>
+            </a:gs>
+            <a:gs pos="100000">
+              <a:schemeClr val="phClr">
+                <a:tint val="15000"/>
+                <a:satMod val="350000"/>
+              </a:schemeClr>
+            </a:gs>
+          </a:gsLst>
+          <a:lin ang="16200000" scaled="1"/>
+        </a:gradFill>
+        <a:gradFill rotWithShape="1">
+          <a:gsLst>
+            <a:gs pos="0">
+              <a:schemeClr val="phClr">
+                <a:shade val="51000"/>
+                <a:satMod val="130000"/>
+              </a:schemeClr>
+            </a:gs>
+            <a:gs pos="80000">
+              <a:schemeClr val="phClr">
+                <a:shade val="93000"/>
+                <a:satMod val="130000"/>
+              </a:schemeClr>
+            </a:gs>
+            <a:gs pos="100000">
+              <a:schemeClr val="phClr">
+                <a:shade val="94000"/>
+                <a:satMod val="135000"/>
+              </a:schemeClr>
+            </a:gs>
+          </a:gsLst>
+          <a:lin ang="16200000" scaled="0"/>
+        </a:gradFill>
+      </a:fillStyleLst>
+      <a:lnStyleLst>
+        <a:ln w="9525" cap="flat" cmpd="sng" algn="ctr">
+          <a:solidFill>
+            <a:schemeClr val="phClr">
+              <a:shade val="95000"/>
+              <a:satMod val="105000"/>
+            </a:schemeClr>
+          </a:solidFill>
+          <a:prstDash val="solid"/>
+        </a:ln>
+        <a:ln w="25400" cap="flat" cmpd="sng" algn="ctr">
+          <a:solidFill>
+            <a:schemeClr val="phClr"/>
+          </a:solidFill>
+          <a:prstDash val="solid"/>
+        </a:ln>
+        <a:ln w="38100" cap="flat" cmpd="sng" algn="ctr">
+          <a:solidFill>
+            <a:schemeClr val="phClr"/>
+          </a:solidFill>
+          <a:prstDash val="solid"/>
+        </a:ln>
+      </a:lnStyleLst>
+      <a:effectStyleLst>
+        <a:effectStyle>
+          <a:effectLst>
+            <a:outerShdw blurRad="40000" dist="20000" dir="5400000" rotWithShape="0">
+              <a:srgbClr val="000000">
+                <a:alpha val="38000"/>
+              </a:srgbClr>
+            </a:outerShdw>
+          </a:effectLst>
+        </a:effectStyle>
+        <a:effectStyle>
+          <a:effectLst>
+            <a:outerShdw blurRad="40000" dist="23000" dir="5400000" rotWithShape="0">
+              <a:srgbClr val="000000">
+                <a:alpha val="35000"/>
+              </a:srgbClr>
+            </a:outerShdw>
+          </a:effectLst>
+        </a:effectStyle>
+        <a:effectStyle>
+          <a:effectLst>
+            <a:outerShdw blurRad="40000" dist="23000" dir="5400000" rotWithShape="0">
+              <a:srgbClr val="000000">
+                <a:alpha val="35000"/>
+              </a:srgbClr>
+            </a:outerShdw>
+          </a:effectLst>
+          <a:scene3d>
+            <a:camera prst="orthographicFront">
+              <a:rot lat="0" lon="0" rev="0"/>
+            </a:camera>
+            <a:lightRig rig="threePt" dir="t">
+              <a:rot lat="0" lon="0" rev="1200000"/>
+            </a:lightRig>
+          </a:scene3d>
+          <a:sp3d>
+            <a:bevelT w="63500" h="25400"/>
+          </a:sp3d>
+        </a:effectStyle>
+      </a:effectStyleLst>
+      <a:bgFillStyleLst>
+        <a:solidFill>
+          <a:schemeClr val="phClr"/>
+        </a:solidFill>
+        <a:gradFill rotWithShape="1">
+          <a:gsLst>
+            <a:gs pos="0">
+              <a:schemeClr val="phClr">
+                <a:tint val="40000"/>
+                <a:satMod val="350000"/>
+              </a:schemeClr>
+            </a:gs>
+            <a:gs pos="40000">
+              <a:schemeClr val="phClr">
+                <a:tint val="45000"/>
+                <a:shade val="99000"/>
+                <a:satMod val="350000"/>
+              </a:schemeClr>
+            </a:gs>
+            <a:gs pos="100000">
+              <a:schemeClr val="phClr">
+                <a:shade val="20000"/>
+                <a:satMod val="255000"/>
+              </a:schemeClr>
+            </a:gs>
+          </a:gsLst>
+          <a:path path="circle">
+            <a:fillToRect l="50000" t="-80000" r="50000" b="180000"/>
+          </a:path>
+        </a:gradFill>
+        <a:gradFill rotWithShape="1">
+          <a:gsLst>
+            <a:gs pos="0">
+              <a:schemeClr val="phClr">
+                <a:tint val="80000"/>
+                <a:satMod val="300000"/>
+              </a:schemeClr>
+            </a:gs>
+            <a:gs pos="100000">
+              <a:schemeClr val="phClr">
+                <a:shade val="30000"/>
+                <a:satMod val="200000"/>
+              </a:schemeClr>
+            </a:gs>
+          </a:gsLst>
+          <a:path path="circle">
+            <a:fillToRect l="50000" t="50000" r="50000" b="50000"/>
+          </a:path>
+        </a:gradFill>
+      </a:bgFillStyleLst>
+    </a:fmtScheme>
+  </a:themeElements>
+  <a:objectDefaults/>
+  <a:extraClrSchemeLst/>
+</a:theme>
 </file>
</xml_diff>

<commit_message>
Kleinere Änderungen an Präsentation
</commit_message>
<xml_diff>
--- a/doc/sharely Präsentation.pptx
+++ b/doc/sharely Präsentation.pptx
@@ -219,7 +219,8 @@
           <a:p>
             <a:fld id="{2E84821E-4335-4310-BD9B-3008C09A3F57}" type="datetimeFigureOut">
               <a:rPr lang="en-GB" smtClean="0"/>
-              <a:t>15/01/2015</a:t>
+              <a:pPr/>
+              <a:t>16/01/2015</a:t>
             </a:fld>
             <a:endParaRPr lang="en-GB"/>
           </a:p>
@@ -380,6 +381,7 @@
           <a:p>
             <a:fld id="{14A9E72B-2877-4B29-A63D-33C1953C9EEE}" type="slidenum">
               <a:rPr lang="en-GB" smtClean="0"/>
+              <a:pPr/>
               <a:t>‹Nr.›</a:t>
             </a:fld>
             <a:endParaRPr lang="en-GB"/>
@@ -1192,7 +1194,7 @@
             <a:fld id="{9711488B-E01B-4F58-B43C-C2F9108E46DD}" type="datetimeFigureOut">
               <a:rPr lang="en-GB" smtClean="0"/>
               <a:pPr/>
-              <a:t>15/01/2015</a:t>
+              <a:t>16/01/2015</a:t>
             </a:fld>
             <a:endParaRPr lang="en-GB"/>
           </a:p>
@@ -1390,7 +1392,7 @@
             <a:fld id="{9711488B-E01B-4F58-B43C-C2F9108E46DD}" type="datetimeFigureOut">
               <a:rPr lang="en-GB" smtClean="0"/>
               <a:pPr/>
-              <a:t>15/01/2015</a:t>
+              <a:t>16/01/2015</a:t>
             </a:fld>
             <a:endParaRPr lang="en-GB"/>
           </a:p>
@@ -1577,7 +1579,7 @@
             <a:fld id="{9711488B-E01B-4F58-B43C-C2F9108E46DD}" type="datetimeFigureOut">
               <a:rPr lang="en-GB" smtClean="0"/>
               <a:pPr/>
-              <a:t>15/01/2015</a:t>
+              <a:t>16/01/2015</a:t>
             </a:fld>
             <a:endParaRPr lang="en-GB"/>
           </a:p>
@@ -1729,7 +1731,7 @@
             <a:fld id="{9711488B-E01B-4F58-B43C-C2F9108E46DD}" type="datetimeFigureOut">
               <a:rPr lang="en-GB" smtClean="0"/>
               <a:pPr/>
-              <a:t>15/01/2015</a:t>
+              <a:t>16/01/2015</a:t>
             </a:fld>
             <a:endParaRPr lang="en-GB"/>
           </a:p>
@@ -1986,7 +1988,7 @@
             <a:fld id="{9711488B-E01B-4F58-B43C-C2F9108E46DD}" type="datetimeFigureOut">
               <a:rPr lang="en-GB" smtClean="0"/>
               <a:pPr/>
-              <a:t>15/01/2015</a:t>
+              <a:t>16/01/2015</a:t>
             </a:fld>
             <a:endParaRPr lang="en-GB"/>
           </a:p>
@@ -2397,7 +2399,7 @@
             <a:fld id="{9711488B-E01B-4F58-B43C-C2F9108E46DD}" type="datetimeFigureOut">
               <a:rPr lang="en-GB" smtClean="0"/>
               <a:pPr/>
-              <a:t>15/01/2015</a:t>
+              <a:t>16/01/2015</a:t>
             </a:fld>
             <a:endParaRPr lang="en-GB"/>
           </a:p>
@@ -2845,7 +2847,7 @@
             <a:fld id="{9711488B-E01B-4F58-B43C-C2F9108E46DD}" type="datetimeFigureOut">
               <a:rPr lang="en-GB" smtClean="0"/>
               <a:pPr/>
-              <a:t>15/01/2015</a:t>
+              <a:t>16/01/2015</a:t>
             </a:fld>
             <a:endParaRPr lang="en-GB"/>
           </a:p>
@@ -2948,7 +2950,7 @@
             <a:fld id="{9711488B-E01B-4F58-B43C-C2F9108E46DD}" type="datetimeFigureOut">
               <a:rPr lang="en-GB" smtClean="0"/>
               <a:pPr/>
-              <a:t>15/01/2015</a:t>
+              <a:t>16/01/2015</a:t>
             </a:fld>
             <a:endParaRPr lang="en-GB"/>
           </a:p>
@@ -3071,7 +3073,7 @@
             <a:fld id="{9711488B-E01B-4F58-B43C-C2F9108E46DD}" type="datetimeFigureOut">
               <a:rPr lang="en-GB" smtClean="0"/>
               <a:pPr/>
-              <a:t>15/01/2015</a:t>
+              <a:t>16/01/2015</a:t>
             </a:fld>
             <a:endParaRPr lang="en-GB"/>
           </a:p>
@@ -3347,7 +3349,7 @@
             <a:fld id="{9711488B-E01B-4F58-B43C-C2F9108E46DD}" type="datetimeFigureOut">
               <a:rPr lang="en-GB" smtClean="0"/>
               <a:pPr/>
-              <a:t>15/01/2015</a:t>
+              <a:t>16/01/2015</a:t>
             </a:fld>
             <a:endParaRPr lang="en-GB"/>
           </a:p>
@@ -3554,7 +3556,7 @@
             <a:fld id="{9711488B-E01B-4F58-B43C-C2F9108E46DD}" type="datetimeFigureOut">
               <a:rPr lang="en-GB" smtClean="0"/>
               <a:pPr/>
-              <a:t>15/01/2015</a:t>
+              <a:t>16/01/2015</a:t>
             </a:fld>
             <a:endParaRPr lang="en-GB"/>
           </a:p>
@@ -4665,7 +4667,7 @@
             <a:fld id="{9711488B-E01B-4F58-B43C-C2F9108E46DD}" type="datetimeFigureOut">
               <a:rPr lang="en-GB" smtClean="0"/>
               <a:pPr/>
-              <a:t>15/01/2015</a:t>
+              <a:t>16/01/2015</a:t>
             </a:fld>
             <a:endParaRPr lang="en-GB"/>
           </a:p>
@@ -5333,7 +5335,6 @@
               <a:rPr lang="de-CH" dirty="0" smtClean="0"/>
               <a:t>Demo der Features</a:t>
             </a:r>
-            <a:endParaRPr lang="de-CH" dirty="0" smtClean="0"/>
           </a:p>
           <a:p>
             <a:pPr lvl="1"/>
@@ -5573,7 +5574,6 @@
               <a:rPr lang="de-CH" dirty="0" smtClean="0"/>
               <a:t>Technologien</a:t>
             </a:r>
-            <a:endParaRPr lang="de-CH" dirty="0" smtClean="0"/>
           </a:p>
           <a:p>
             <a:r>
@@ -5587,14 +5587,14 @@
               <a:rPr lang="de-CH" dirty="0" smtClean="0"/>
               <a:t>Datenbank</a:t>
             </a:r>
+          </a:p>
+          <a:p>
+            <a:pPr lvl="1"/>
+            <a:r>
+              <a:rPr lang="de-CH" dirty="0" smtClean="0"/>
+              <a:t>MVC</a:t>
+            </a:r>
             <a:endParaRPr lang="de-CH" dirty="0" smtClean="0"/>
-          </a:p>
-          <a:p>
-            <a:pPr lvl="1"/>
-            <a:r>
-              <a:rPr lang="de-CH" dirty="0" smtClean="0"/>
-              <a:t>Projektstruktur</a:t>
-            </a:r>
           </a:p>
           <a:p>
             <a:pPr lvl="1"/>
@@ -5609,14 +5609,12 @@
               <a:rPr lang="de-CH" dirty="0" smtClean="0"/>
               <a:t>Suche &amp; Navigation</a:t>
             </a:r>
-            <a:endParaRPr lang="de-CH" dirty="0" smtClean="0"/>
           </a:p>
           <a:p>
             <a:r>
               <a:rPr lang="de-CH" dirty="0" smtClean="0"/>
               <a:t>Demo</a:t>
             </a:r>
-            <a:endParaRPr lang="de-CH" dirty="0" smtClean="0"/>
           </a:p>
           <a:p>
             <a:r>
@@ -5995,6 +5993,14 @@
               <a:rPr lang="de-CH" dirty="0" err="1" smtClean="0"/>
               <a:t>ScrumDesk</a:t>
             </a:r>
+            <a:r>
+              <a:rPr lang="de-CH" dirty="0" smtClean="0"/>
+              <a:t>, </a:t>
+            </a:r>
+            <a:r>
+              <a:rPr lang="de-CH" smtClean="0"/>
+              <a:t>Eclipse</a:t>
+            </a:r>
             <a:endParaRPr lang="de-CH" dirty="0" smtClean="0"/>
           </a:p>
           <a:p>
@@ -6106,11 +6112,7 @@
           <a:p>
             <a:r>
               <a:rPr lang="de-CH" dirty="0" smtClean="0"/>
-              <a:t>Eigenes </a:t>
-            </a:r>
-            <a:r>
-              <a:rPr lang="de-CH" dirty="0" smtClean="0"/>
-              <a:t>MVC-Framework</a:t>
+              <a:t>Eigenes MVC-Framework</a:t>
             </a:r>
           </a:p>
           <a:p>

</xml_diff>